<commit_message>
almost done js slides - todo: ajax
</commit_message>
<xml_diff>
--- a/Session III - Javascript/Session III - Javascript.pptx
+++ b/Session III - Javascript/Session III - Javascript.pptx
@@ -5,7 +5,7 @@
     <p:sldMasterId id="2147483648" r:id="rId1"/>
   </p:sldMasterIdLst>
   <p:notesMasterIdLst>
-    <p:notesMasterId r:id="rId29"/>
+    <p:notesMasterId r:id="rId33"/>
   </p:notesMasterIdLst>
   <p:sldIdLst>
     <p:sldId id="256" r:id="rId2"/>
@@ -31,10 +31,14 @@
     <p:sldId id="280" r:id="rId22"/>
     <p:sldId id="281" r:id="rId23"/>
     <p:sldId id="282" r:id="rId24"/>
-    <p:sldId id="265" r:id="rId25"/>
-    <p:sldId id="283" r:id="rId26"/>
-    <p:sldId id="284" r:id="rId27"/>
-    <p:sldId id="266" r:id="rId28"/>
+    <p:sldId id="284" r:id="rId25"/>
+    <p:sldId id="285" r:id="rId26"/>
+    <p:sldId id="287" r:id="rId27"/>
+    <p:sldId id="265" r:id="rId28"/>
+    <p:sldId id="283" r:id="rId29"/>
+    <p:sldId id="286" r:id="rId30"/>
+    <p:sldId id="288" r:id="rId31"/>
+    <p:sldId id="266" r:id="rId32"/>
   </p:sldIdLst>
   <p:sldSz cx="9144000" cy="6858000" type="screen4x3"/>
   <p:notesSz cx="6858000" cy="9144000"/>
@@ -1903,7 +1907,7 @@
           <a:p>
             <a:fld id="{B46DC61D-F376-43F7-97B2-0F5A9328ABFE}" type="slidenum">
               <a:rPr lang="en-US" smtClean="0"/>
-              <a:t>25</a:t>
+              <a:t>24</a:t>
             </a:fld>
             <a:endParaRPr lang="en-US"/>
           </a:p>
@@ -1992,7 +1996,363 @@
           <a:p>
             <a:fld id="{B46DC61D-F376-43F7-97B2-0F5A9328ABFE}" type="slidenum">
               <a:rPr lang="en-US" smtClean="0"/>
+              <a:t>25</a:t>
+            </a:fld>
+            <a:endParaRPr lang="en-US"/>
+          </a:p>
+        </p:txBody>
+      </p:sp>
+    </p:spTree>
+    <p:extLst>
+      <p:ext uri="{BB962C8B-B14F-4D97-AF65-F5344CB8AC3E}">
+        <p14:creationId xmlns:p14="http://schemas.microsoft.com/office/powerpoint/2010/main" val="2525163576"/>
+      </p:ext>
+    </p:extLst>
+  </p:cSld>
+  <p:clrMapOvr>
+    <a:masterClrMapping/>
+  </p:clrMapOvr>
+</p:notes>
+</file>
+
+<file path=ppt/notesSlides/notesSlide25.xml><?xml version="1.0" encoding="utf-8"?>
+<p:notes xmlns:a="http://schemas.openxmlformats.org/drawingml/2006/main" xmlns:r="http://schemas.openxmlformats.org/officeDocument/2006/relationships" xmlns:p="http://schemas.openxmlformats.org/presentationml/2006/main">
+  <p:cSld>
+    <p:spTree>
+      <p:nvGrpSpPr>
+        <p:cNvPr id="1" name=""/>
+        <p:cNvGrpSpPr/>
+        <p:nvPr/>
+      </p:nvGrpSpPr>
+      <p:grpSpPr>
+        <a:xfrm>
+          <a:off x="0" y="0"/>
+          <a:ext cx="0" cy="0"/>
+          <a:chOff x="0" y="0"/>
+          <a:chExt cx="0" cy="0"/>
+        </a:xfrm>
+      </p:grpSpPr>
+      <p:sp>
+        <p:nvSpPr>
+          <p:cNvPr id="2" name="Slide Image Placeholder 1"/>
+          <p:cNvSpPr>
+            <a:spLocks noGrp="1" noRot="1" noChangeAspect="1"/>
+          </p:cNvSpPr>
+          <p:nvPr>
+            <p:ph type="sldImg"/>
+          </p:nvPr>
+        </p:nvSpPr>
+        <p:spPr>
+          <a:xfrm>
+            <a:off x="1143000" y="685800"/>
+            <a:ext cx="4572000" cy="3429000"/>
+          </a:xfrm>
+        </p:spPr>
+      </p:sp>
+      <p:sp>
+        <p:nvSpPr>
+          <p:cNvPr id="3" name="Notes Placeholder 2"/>
+          <p:cNvSpPr>
+            <a:spLocks noGrp="1"/>
+          </p:cNvSpPr>
+          <p:nvPr>
+            <p:ph type="body" idx="1"/>
+          </p:nvPr>
+        </p:nvSpPr>
+        <p:spPr/>
+        <p:txBody>
+          <a:bodyPr/>
+          <a:lstStyle/>
+          <a:p>
+            <a:endParaRPr lang="en-US" dirty="0"/>
+          </a:p>
+        </p:txBody>
+      </p:sp>
+      <p:sp>
+        <p:nvSpPr>
+          <p:cNvPr id="4" name="Slide Number Placeholder 3"/>
+          <p:cNvSpPr>
+            <a:spLocks noGrp="1"/>
+          </p:cNvSpPr>
+          <p:nvPr>
+            <p:ph type="sldNum" sz="quarter" idx="10"/>
+          </p:nvPr>
+        </p:nvSpPr>
+        <p:spPr/>
+        <p:txBody>
+          <a:bodyPr/>
+          <a:lstStyle/>
+          <a:p>
+            <a:fld id="{B46DC61D-F376-43F7-97B2-0F5A9328ABFE}" type="slidenum">
+              <a:rPr lang="en-US" smtClean="0"/>
               <a:t>26</a:t>
+            </a:fld>
+            <a:endParaRPr lang="en-US"/>
+          </a:p>
+        </p:txBody>
+      </p:sp>
+    </p:spTree>
+    <p:extLst>
+      <p:ext uri="{BB962C8B-B14F-4D97-AF65-F5344CB8AC3E}">
+        <p14:creationId xmlns:p14="http://schemas.microsoft.com/office/powerpoint/2010/main" val="2525163576"/>
+      </p:ext>
+    </p:extLst>
+  </p:cSld>
+  <p:clrMapOvr>
+    <a:masterClrMapping/>
+  </p:clrMapOvr>
+</p:notes>
+</file>
+
+<file path=ppt/notesSlides/notesSlide26.xml><?xml version="1.0" encoding="utf-8"?>
+<p:notes xmlns:a="http://schemas.openxmlformats.org/drawingml/2006/main" xmlns:r="http://schemas.openxmlformats.org/officeDocument/2006/relationships" xmlns:p="http://schemas.openxmlformats.org/presentationml/2006/main">
+  <p:cSld>
+    <p:spTree>
+      <p:nvGrpSpPr>
+        <p:cNvPr id="1" name=""/>
+        <p:cNvGrpSpPr/>
+        <p:nvPr/>
+      </p:nvGrpSpPr>
+      <p:grpSpPr>
+        <a:xfrm>
+          <a:off x="0" y="0"/>
+          <a:ext cx="0" cy="0"/>
+          <a:chOff x="0" y="0"/>
+          <a:chExt cx="0" cy="0"/>
+        </a:xfrm>
+      </p:grpSpPr>
+      <p:sp>
+        <p:nvSpPr>
+          <p:cNvPr id="2" name="Slide Image Placeholder 1"/>
+          <p:cNvSpPr>
+            <a:spLocks noGrp="1" noRot="1" noChangeAspect="1"/>
+          </p:cNvSpPr>
+          <p:nvPr>
+            <p:ph type="sldImg"/>
+          </p:nvPr>
+        </p:nvSpPr>
+        <p:spPr>
+          <a:xfrm>
+            <a:off x="1143000" y="685800"/>
+            <a:ext cx="4572000" cy="3429000"/>
+          </a:xfrm>
+        </p:spPr>
+      </p:sp>
+      <p:sp>
+        <p:nvSpPr>
+          <p:cNvPr id="3" name="Notes Placeholder 2"/>
+          <p:cNvSpPr>
+            <a:spLocks noGrp="1"/>
+          </p:cNvSpPr>
+          <p:nvPr>
+            <p:ph type="body" idx="1"/>
+          </p:nvPr>
+        </p:nvSpPr>
+        <p:spPr/>
+        <p:txBody>
+          <a:bodyPr/>
+          <a:lstStyle/>
+          <a:p>
+            <a:endParaRPr lang="en-US" dirty="0"/>
+          </a:p>
+        </p:txBody>
+      </p:sp>
+      <p:sp>
+        <p:nvSpPr>
+          <p:cNvPr id="4" name="Slide Number Placeholder 3"/>
+          <p:cNvSpPr>
+            <a:spLocks noGrp="1"/>
+          </p:cNvSpPr>
+          <p:nvPr>
+            <p:ph type="sldNum" sz="quarter" idx="10"/>
+          </p:nvPr>
+        </p:nvSpPr>
+        <p:spPr/>
+        <p:txBody>
+          <a:bodyPr/>
+          <a:lstStyle/>
+          <a:p>
+            <a:fld id="{B46DC61D-F376-43F7-97B2-0F5A9328ABFE}" type="slidenum">
+              <a:rPr lang="en-US" smtClean="0"/>
+              <a:t>28</a:t>
+            </a:fld>
+            <a:endParaRPr lang="en-US"/>
+          </a:p>
+        </p:txBody>
+      </p:sp>
+    </p:spTree>
+    <p:extLst>
+      <p:ext uri="{BB962C8B-B14F-4D97-AF65-F5344CB8AC3E}">
+        <p14:creationId xmlns:p14="http://schemas.microsoft.com/office/powerpoint/2010/main" val="2525163576"/>
+      </p:ext>
+    </p:extLst>
+  </p:cSld>
+  <p:clrMapOvr>
+    <a:masterClrMapping/>
+  </p:clrMapOvr>
+</p:notes>
+</file>
+
+<file path=ppt/notesSlides/notesSlide27.xml><?xml version="1.0" encoding="utf-8"?>
+<p:notes xmlns:a="http://schemas.openxmlformats.org/drawingml/2006/main" xmlns:r="http://schemas.openxmlformats.org/officeDocument/2006/relationships" xmlns:p="http://schemas.openxmlformats.org/presentationml/2006/main">
+  <p:cSld>
+    <p:spTree>
+      <p:nvGrpSpPr>
+        <p:cNvPr id="1" name=""/>
+        <p:cNvGrpSpPr/>
+        <p:nvPr/>
+      </p:nvGrpSpPr>
+      <p:grpSpPr>
+        <a:xfrm>
+          <a:off x="0" y="0"/>
+          <a:ext cx="0" cy="0"/>
+          <a:chOff x="0" y="0"/>
+          <a:chExt cx="0" cy="0"/>
+        </a:xfrm>
+      </p:grpSpPr>
+      <p:sp>
+        <p:nvSpPr>
+          <p:cNvPr id="2" name="Slide Image Placeholder 1"/>
+          <p:cNvSpPr>
+            <a:spLocks noGrp="1" noRot="1" noChangeAspect="1"/>
+          </p:cNvSpPr>
+          <p:nvPr>
+            <p:ph type="sldImg"/>
+          </p:nvPr>
+        </p:nvSpPr>
+        <p:spPr>
+          <a:xfrm>
+            <a:off x="1143000" y="685800"/>
+            <a:ext cx="4572000" cy="3429000"/>
+          </a:xfrm>
+        </p:spPr>
+      </p:sp>
+      <p:sp>
+        <p:nvSpPr>
+          <p:cNvPr id="3" name="Notes Placeholder 2"/>
+          <p:cNvSpPr>
+            <a:spLocks noGrp="1"/>
+          </p:cNvSpPr>
+          <p:nvPr>
+            <p:ph type="body" idx="1"/>
+          </p:nvPr>
+        </p:nvSpPr>
+        <p:spPr/>
+        <p:txBody>
+          <a:bodyPr/>
+          <a:lstStyle/>
+          <a:p>
+            <a:endParaRPr lang="en-US" dirty="0"/>
+          </a:p>
+        </p:txBody>
+      </p:sp>
+      <p:sp>
+        <p:nvSpPr>
+          <p:cNvPr id="4" name="Slide Number Placeholder 3"/>
+          <p:cNvSpPr>
+            <a:spLocks noGrp="1"/>
+          </p:cNvSpPr>
+          <p:nvPr>
+            <p:ph type="sldNum" sz="quarter" idx="10"/>
+          </p:nvPr>
+        </p:nvSpPr>
+        <p:spPr/>
+        <p:txBody>
+          <a:bodyPr/>
+          <a:lstStyle/>
+          <a:p>
+            <a:fld id="{B46DC61D-F376-43F7-97B2-0F5A9328ABFE}" type="slidenum">
+              <a:rPr lang="en-US" smtClean="0"/>
+              <a:t>29</a:t>
+            </a:fld>
+            <a:endParaRPr lang="en-US"/>
+          </a:p>
+        </p:txBody>
+      </p:sp>
+    </p:spTree>
+    <p:extLst>
+      <p:ext uri="{BB962C8B-B14F-4D97-AF65-F5344CB8AC3E}">
+        <p14:creationId xmlns:p14="http://schemas.microsoft.com/office/powerpoint/2010/main" val="2525163576"/>
+      </p:ext>
+    </p:extLst>
+  </p:cSld>
+  <p:clrMapOvr>
+    <a:masterClrMapping/>
+  </p:clrMapOvr>
+</p:notes>
+</file>
+
+<file path=ppt/notesSlides/notesSlide28.xml><?xml version="1.0" encoding="utf-8"?>
+<p:notes xmlns:a="http://schemas.openxmlformats.org/drawingml/2006/main" xmlns:r="http://schemas.openxmlformats.org/officeDocument/2006/relationships" xmlns:p="http://schemas.openxmlformats.org/presentationml/2006/main">
+  <p:cSld>
+    <p:spTree>
+      <p:nvGrpSpPr>
+        <p:cNvPr id="1" name=""/>
+        <p:cNvGrpSpPr/>
+        <p:nvPr/>
+      </p:nvGrpSpPr>
+      <p:grpSpPr>
+        <a:xfrm>
+          <a:off x="0" y="0"/>
+          <a:ext cx="0" cy="0"/>
+          <a:chOff x="0" y="0"/>
+          <a:chExt cx="0" cy="0"/>
+        </a:xfrm>
+      </p:grpSpPr>
+      <p:sp>
+        <p:nvSpPr>
+          <p:cNvPr id="2" name="Slide Image Placeholder 1"/>
+          <p:cNvSpPr>
+            <a:spLocks noGrp="1" noRot="1" noChangeAspect="1"/>
+          </p:cNvSpPr>
+          <p:nvPr>
+            <p:ph type="sldImg"/>
+          </p:nvPr>
+        </p:nvSpPr>
+        <p:spPr>
+          <a:xfrm>
+            <a:off x="1143000" y="685800"/>
+            <a:ext cx="4572000" cy="3429000"/>
+          </a:xfrm>
+        </p:spPr>
+      </p:sp>
+      <p:sp>
+        <p:nvSpPr>
+          <p:cNvPr id="3" name="Notes Placeholder 2"/>
+          <p:cNvSpPr>
+            <a:spLocks noGrp="1"/>
+          </p:cNvSpPr>
+          <p:nvPr>
+            <p:ph type="body" idx="1"/>
+          </p:nvPr>
+        </p:nvSpPr>
+        <p:spPr/>
+        <p:txBody>
+          <a:bodyPr/>
+          <a:lstStyle/>
+          <a:p>
+            <a:endParaRPr lang="en-US" dirty="0"/>
+          </a:p>
+        </p:txBody>
+      </p:sp>
+      <p:sp>
+        <p:nvSpPr>
+          <p:cNvPr id="4" name="Slide Number Placeholder 3"/>
+          <p:cNvSpPr>
+            <a:spLocks noGrp="1"/>
+          </p:cNvSpPr>
+          <p:nvPr>
+            <p:ph type="sldNum" sz="quarter" idx="10"/>
+          </p:nvPr>
+        </p:nvSpPr>
+        <p:spPr/>
+        <p:txBody>
+          <a:bodyPr/>
+          <a:lstStyle/>
+          <a:p>
+            <a:fld id="{B46DC61D-F376-43F7-97B2-0F5A9328ABFE}" type="slidenum">
+              <a:rPr lang="en-US" smtClean="0"/>
+              <a:t>30</a:t>
             </a:fld>
             <a:endParaRPr lang="en-US"/>
           </a:p>
@@ -8435,17 +8795,6 @@
 <file path=ppt/slides/slide24.xml><?xml version="1.0" encoding="utf-8"?>
 <p:sld xmlns:a="http://schemas.openxmlformats.org/drawingml/2006/main" xmlns:r="http://schemas.openxmlformats.org/officeDocument/2006/relationships" xmlns:p="http://schemas.openxmlformats.org/presentationml/2006/main">
   <p:cSld>
-    <p:bg>
-      <p:bgPr>
-        <a:solidFill>
-          <a:schemeClr val="tx1">
-            <a:lumMod val="85000"/>
-            <a:lumOff val="15000"/>
-          </a:schemeClr>
-        </a:solidFill>
-        <a:effectLst/>
-      </p:bgPr>
-    </p:bg>
     <p:spTree>
       <p:nvGrpSpPr>
         <p:cNvPr id="1" name=""/>
@@ -8462,19 +8811,24 @@
       </p:grpSpPr>
       <p:sp>
         <p:nvSpPr>
-          <p:cNvPr id="4" name="TextBox 3"/>
+          <p:cNvPr id="3" name="TextBox 2"/>
           <p:cNvSpPr txBox="1"/>
           <p:nvPr/>
         </p:nvSpPr>
         <p:spPr>
           <a:xfrm>
-            <a:off x="609600" y="3124201"/>
-            <a:ext cx="5257800" cy="523220"/>
+            <a:off x="0" y="152402"/>
+            <a:ext cx="1332300" cy="338554"/>
           </a:xfrm>
           <a:prstGeom prst="rect">
             <a:avLst/>
           </a:prstGeom>
-          <a:noFill/>
+          <a:solidFill>
+            <a:schemeClr val="tx1">
+              <a:lumMod val="85000"/>
+              <a:lumOff val="15000"/>
+            </a:schemeClr>
+          </a:solidFill>
         </p:spPr>
         <p:txBody>
           <a:bodyPr wrap="square" rtlCol="0">
@@ -8482,30 +8836,141 @@
           </a:bodyPr>
           <a:lstStyle/>
           <a:p>
-            <a:r>
-              <a:rPr lang="en-US" sz="2800" b="1" dirty="0" err="1" smtClean="0">
+            <a:pPr algn="ctr"/>
+            <a:r>
+              <a:rPr lang="en-US" sz="1600" b="1" dirty="0" smtClean="0">
                 <a:solidFill>
                   <a:schemeClr val="bg1"/>
                 </a:solidFill>
                 <a:latin typeface="Candara" panose="020E0502030303020204" pitchFamily="34" charset="0"/>
-                <a:cs typeface="Iskoola Pota" panose="020B0502040204020203" pitchFamily="34" charset="0"/>
-              </a:rPr>
-              <a:t>jQuery</a:t>
-            </a:r>
-            <a:endParaRPr lang="en-US" sz="2800" b="1" dirty="0">
+              </a:rPr>
+              <a:t>JAVASCRIPT</a:t>
+            </a:r>
+            <a:endParaRPr lang="en-US" sz="1600" b="1" dirty="0">
               <a:solidFill>
                 <a:schemeClr val="bg1"/>
               </a:solidFill>
               <a:latin typeface="Candara" panose="020E0502030303020204" pitchFamily="34" charset="0"/>
-              <a:cs typeface="Iskoola Pota" panose="020B0502040204020203" pitchFamily="34" charset="0"/>
             </a:endParaRPr>
           </a:p>
         </p:txBody>
       </p:sp>
+      <p:sp>
+        <p:nvSpPr>
+          <p:cNvPr id="4" name="TextBox 3"/>
+          <p:cNvSpPr txBox="1"/>
+          <p:nvPr/>
+        </p:nvSpPr>
+        <p:spPr>
+          <a:xfrm>
+            <a:off x="7919092" y="159446"/>
+            <a:ext cx="1232283" cy="338554"/>
+          </a:xfrm>
+          <a:prstGeom prst="rect">
+            <a:avLst/>
+          </a:prstGeom>
+          <a:solidFill>
+            <a:schemeClr val="accent5"/>
+          </a:solidFill>
+        </p:spPr>
+        <p:txBody>
+          <a:bodyPr wrap="square" rtlCol="0">
+            <a:spAutoFit/>
+          </a:bodyPr>
+          <a:lstStyle/>
+          <a:p>
+            <a:pPr algn="ctr"/>
+            <a:r>
+              <a:rPr lang="en-US" sz="1600" b="1" dirty="0" smtClean="0">
+                <a:solidFill>
+                  <a:schemeClr val="bg1"/>
+                </a:solidFill>
+                <a:latin typeface="Candara" panose="020E0502030303020204" pitchFamily="34" charset="0"/>
+              </a:rPr>
+              <a:t>SCOPE</a:t>
+            </a:r>
+            <a:endParaRPr lang="en-US" sz="1600" b="1" dirty="0">
+              <a:solidFill>
+                <a:schemeClr val="bg1"/>
+              </a:solidFill>
+              <a:latin typeface="Candara" panose="020E0502030303020204" pitchFamily="34" charset="0"/>
+            </a:endParaRPr>
+          </a:p>
+        </p:txBody>
+      </p:sp>
+      <p:sp>
+        <p:nvSpPr>
+          <p:cNvPr id="5" name="Rectangle 4"/>
+          <p:cNvSpPr/>
+          <p:nvPr/>
+        </p:nvSpPr>
+        <p:spPr>
+          <a:xfrm>
+            <a:off x="368482" y="690126"/>
+            <a:ext cx="8173181" cy="369332"/>
+          </a:xfrm>
+          <a:prstGeom prst="rect">
+            <a:avLst/>
+          </a:prstGeom>
+        </p:spPr>
+        <p:txBody>
+          <a:bodyPr wrap="square">
+            <a:spAutoFit/>
+          </a:bodyPr>
+          <a:lstStyle/>
+          <a:p>
+            <a:r>
+              <a:rPr lang="en-US" dirty="0" smtClean="0">
+                <a:solidFill>
+                  <a:srgbClr val="CC3333"/>
+                </a:solidFill>
+                <a:latin typeface="Candara"/>
+                <a:cs typeface="Candara"/>
+              </a:rPr>
+              <a:t>Scope</a:t>
+            </a:r>
+            <a:r>
+              <a:rPr lang="en-US" dirty="0" smtClean="0">
+                <a:latin typeface="Candara"/>
+                <a:cs typeface="Candara"/>
+              </a:rPr>
+              <a:t> refers to the variables that are available to a piece of code at a given time.</a:t>
+            </a:r>
+            <a:endParaRPr lang="en-US" dirty="0">
+              <a:latin typeface="Candara"/>
+              <a:cs typeface="Candara"/>
+            </a:endParaRPr>
+          </a:p>
+        </p:txBody>
+      </p:sp>
+      <p:pic>
+        <p:nvPicPr>
+          <p:cNvPr id="9" name="Picture 8"/>
+          <p:cNvPicPr>
+            <a:picLocks noChangeAspect="1"/>
+          </p:cNvPicPr>
+          <p:nvPr/>
+        </p:nvPicPr>
+        <p:blipFill>
+          <a:blip r:embed="rId3"/>
+          <a:stretch>
+            <a:fillRect/>
+          </a:stretch>
+        </p:blipFill>
+        <p:spPr>
+          <a:xfrm>
+            <a:off x="1182884" y="1180472"/>
+            <a:ext cx="6401878" cy="5677528"/>
+          </a:xfrm>
+          <a:prstGeom prst="rect">
+            <a:avLst/>
+          </a:prstGeom>
+        </p:spPr>
+      </p:pic>
     </p:spTree>
     <p:extLst>
       <p:ext uri="{BB962C8B-B14F-4D97-AF65-F5344CB8AC3E}">
-        <p14:creationId xmlns:p14="http://schemas.microsoft.com/office/powerpoint/2010/main" val="2813627542"/>
+        <p14:creationId xmlns:p14="http://schemas.microsoft.com/office/powerpoint/2010/main" val="2070659320"/>
       </p:ext>
     </p:extLst>
   </p:cSld>
@@ -8548,7 +9013,7 @@
         <p:spPr>
           <a:xfrm>
             <a:off x="0" y="152402"/>
-            <a:ext cx="1008564" cy="338554"/>
+            <a:ext cx="1332300" cy="338554"/>
           </a:xfrm>
           <a:prstGeom prst="rect">
             <a:avLst/>
@@ -8568,13 +9033,13 @@
           <a:p>
             <a:pPr algn="ctr"/>
             <a:r>
-              <a:rPr lang="en-US" sz="1600" b="1" dirty="0" err="1" smtClean="0">
+              <a:rPr lang="en-US" sz="1600" b="1" dirty="0" smtClean="0">
                 <a:solidFill>
                   <a:schemeClr val="bg1"/>
                 </a:solidFill>
                 <a:latin typeface="Candara" panose="020E0502030303020204" pitchFamily="34" charset="0"/>
               </a:rPr>
-              <a:t>jQUERY</a:t>
+              <a:t>JAVASCRIPT</a:t>
             </a:r>
             <a:endParaRPr lang="en-US" sz="1600" b="1" dirty="0">
               <a:solidFill>
@@ -8593,8 +9058,8 @@
         </p:nvSpPr>
         <p:spPr>
           <a:xfrm>
-            <a:off x="7172009" y="159446"/>
-            <a:ext cx="1979367" cy="338554"/>
+            <a:off x="7919092" y="159446"/>
+            <a:ext cx="1232283" cy="338554"/>
           </a:xfrm>
           <a:prstGeom prst="rect">
             <a:avLst/>
@@ -8617,7 +9082,7 @@
                 </a:solidFill>
                 <a:latin typeface="Candara" panose="020E0502030303020204" pitchFamily="34" charset="0"/>
               </a:rPr>
-              <a:t>DOCUMENT READY</a:t>
+              <a:t>SCOPE</a:t>
             </a:r>
             <a:endParaRPr lang="en-US" sz="1600" b="1" dirty="0">
               <a:solidFill>
@@ -8630,26 +9095,18 @@
       </p:sp>
       <p:sp>
         <p:nvSpPr>
-          <p:cNvPr id="2" name="Rectangle 1"/>
+          <p:cNvPr id="5" name="Rectangle 4"/>
           <p:cNvSpPr/>
           <p:nvPr/>
         </p:nvSpPr>
         <p:spPr>
           <a:xfrm>
-            <a:off x="281324" y="1009302"/>
-            <a:ext cx="3105459" cy="923330"/>
+            <a:off x="380934" y="6131698"/>
+            <a:ext cx="988721" cy="369332"/>
           </a:xfrm>
           <a:prstGeom prst="rect">
             <a:avLst/>
           </a:prstGeom>
-          <a:ln>
-            <a:solidFill>
-              <a:schemeClr val="tx1">
-                <a:lumMod val="50000"/>
-                <a:lumOff val="50000"/>
-              </a:schemeClr>
-            </a:solidFill>
-          </a:ln>
         </p:spPr>
         <p:txBody>
           <a:bodyPr wrap="square">
@@ -8658,544 +9115,52 @@
           <a:lstStyle/>
           <a:p>
             <a:r>
-              <a:rPr lang="en-US" dirty="0" err="1">
+              <a:rPr lang="en-US" dirty="0" smtClean="0">
                 <a:solidFill>
                   <a:srgbClr val="CC3333"/>
                 </a:solidFill>
                 <a:latin typeface="Candara"/>
                 <a:cs typeface="Candara"/>
               </a:rPr>
-              <a:t>window.onload</a:t>
-            </a:r>
-            <a:r>
-              <a:rPr lang="en-US" dirty="0">
-                <a:latin typeface="Candara"/>
-                <a:cs typeface="Candara"/>
-              </a:rPr>
-              <a:t> = function() </a:t>
-            </a:r>
-            <a:r>
-              <a:rPr lang="en-US" dirty="0" smtClean="0">
-                <a:latin typeface="Candara"/>
-                <a:cs typeface="Candara"/>
-              </a:rPr>
-              <a:t>{</a:t>
+              <a:t>WEIRD!!</a:t>
             </a:r>
             <a:endParaRPr lang="en-US" dirty="0">
               <a:latin typeface="Candara"/>
               <a:cs typeface="Candara"/>
             </a:endParaRPr>
           </a:p>
-          <a:p>
-            <a:r>
-              <a:rPr lang="en-US" dirty="0">
-                <a:latin typeface="Candara"/>
-                <a:cs typeface="Candara"/>
-              </a:rPr>
-              <a:t>    alert( "welcome" )</a:t>
-            </a:r>
-            <a:r>
-              <a:rPr lang="en-US" dirty="0" smtClean="0">
-                <a:latin typeface="Candara"/>
-                <a:cs typeface="Candara"/>
-              </a:rPr>
-              <a:t>;</a:t>
-            </a:r>
-            <a:endParaRPr lang="en-US" dirty="0">
-              <a:latin typeface="Candara"/>
-              <a:cs typeface="Candara"/>
-            </a:endParaRPr>
-          </a:p>
-          <a:p>
-            <a:r>
-              <a:rPr lang="en-US" dirty="0">
-                <a:latin typeface="Candara"/>
-                <a:cs typeface="Candara"/>
-              </a:rPr>
-              <a:t>};</a:t>
-            </a:r>
-          </a:p>
-        </p:txBody>
-      </p:sp>
-      <p:sp>
-        <p:nvSpPr>
-          <p:cNvPr id="6" name="Rectangle 5"/>
-          <p:cNvSpPr/>
+        </p:txBody>
+      </p:sp>
+      <p:pic>
+        <p:nvPicPr>
+          <p:cNvPr id="2" name="Picture 1"/>
+          <p:cNvPicPr>
+            <a:picLocks noChangeAspect="1"/>
+          </p:cNvPicPr>
           <p:nvPr/>
-        </p:nvSpPr>
-        <p:spPr>
-          <a:xfrm>
-            <a:off x="3959545" y="2067730"/>
-            <a:ext cx="5080173" cy="923330"/>
+        </p:nvPicPr>
+        <p:blipFill>
+          <a:blip r:embed="rId3">
+            <a:grayscl/>
+          </a:blip>
+          <a:stretch>
+            <a:fillRect/>
+          </a:stretch>
+        </p:blipFill>
+        <p:spPr>
+          <a:xfrm>
+            <a:off x="722182" y="1169859"/>
+            <a:ext cx="7525317" cy="4446778"/>
           </a:xfrm>
           <a:prstGeom prst="rect">
             <a:avLst/>
           </a:prstGeom>
         </p:spPr>
-        <p:txBody>
-          <a:bodyPr wrap="square">
-            <a:spAutoFit/>
-          </a:bodyPr>
-          <a:lstStyle/>
-          <a:p>
-            <a:pPr algn="just"/>
-            <a:r>
-              <a:rPr lang="en-US" i="1" dirty="0" smtClean="0">
-                <a:solidFill>
-                  <a:srgbClr val="7F7F7F"/>
-                </a:solidFill>
-                <a:latin typeface="Candara"/>
-                <a:cs typeface="Candara"/>
-              </a:rPr>
-              <a:t>To </a:t>
-            </a:r>
-            <a:r>
-              <a:rPr lang="en-US" i="1" dirty="0">
-                <a:solidFill>
-                  <a:srgbClr val="7F7F7F"/>
-                </a:solidFill>
-                <a:latin typeface="Candara"/>
-                <a:cs typeface="Candara"/>
-              </a:rPr>
-              <a:t>run code as soon as the document is ready to be manipulated, </a:t>
-            </a:r>
-            <a:r>
-              <a:rPr lang="en-US" i="1" dirty="0" err="1">
-                <a:solidFill>
-                  <a:srgbClr val="CC3333"/>
-                </a:solidFill>
-                <a:latin typeface="Candara"/>
-                <a:cs typeface="Candara"/>
-              </a:rPr>
-              <a:t>jQuery</a:t>
-            </a:r>
-            <a:r>
-              <a:rPr lang="en-US" i="1" dirty="0">
-                <a:solidFill>
-                  <a:srgbClr val="CC3333"/>
-                </a:solidFill>
-                <a:latin typeface="Candara"/>
-                <a:cs typeface="Candara"/>
-              </a:rPr>
-              <a:t> </a:t>
-            </a:r>
-            <a:r>
-              <a:rPr lang="en-US" i="1" dirty="0">
-                <a:solidFill>
-                  <a:srgbClr val="7F7F7F"/>
-                </a:solidFill>
-                <a:latin typeface="Candara"/>
-                <a:cs typeface="Candara"/>
-              </a:rPr>
-              <a:t>has a statement known as the ready </a:t>
-            </a:r>
-            <a:r>
-              <a:rPr lang="en-US" i="1" dirty="0" smtClean="0">
-                <a:solidFill>
-                  <a:srgbClr val="7F7F7F"/>
-                </a:solidFill>
-                <a:latin typeface="Candara"/>
-                <a:cs typeface="Candara"/>
-              </a:rPr>
-              <a:t>event:</a:t>
-            </a:r>
-            <a:endParaRPr lang="en-US" i="1" dirty="0">
-              <a:solidFill>
-                <a:srgbClr val="7F7F7F"/>
-              </a:solidFill>
-              <a:latin typeface="Candara"/>
-              <a:cs typeface="Candara"/>
-            </a:endParaRPr>
-          </a:p>
-        </p:txBody>
-      </p:sp>
-      <p:sp>
-        <p:nvSpPr>
-          <p:cNvPr id="7" name="Rectangle 6"/>
-          <p:cNvSpPr/>
-          <p:nvPr/>
-        </p:nvSpPr>
-        <p:spPr>
-          <a:xfrm>
-            <a:off x="4178613" y="984396"/>
-            <a:ext cx="4572000" cy="923330"/>
-          </a:xfrm>
-          <a:prstGeom prst="rect">
-            <a:avLst/>
-          </a:prstGeom>
-          <a:ln>
-            <a:solidFill>
-              <a:srgbClr val="7F7F7F"/>
-            </a:solidFill>
-          </a:ln>
-        </p:spPr>
-        <p:txBody>
-          <a:bodyPr>
-            <a:spAutoFit/>
-          </a:bodyPr>
-          <a:lstStyle/>
-          <a:p>
-            <a:r>
-              <a:rPr lang="en-US" dirty="0">
-                <a:latin typeface="Candara"/>
-                <a:cs typeface="Candara"/>
-              </a:rPr>
-              <a:t>$( document ).</a:t>
-            </a:r>
-            <a:r>
-              <a:rPr lang="en-US" dirty="0">
-                <a:solidFill>
-                  <a:srgbClr val="CC3333"/>
-                </a:solidFill>
-                <a:latin typeface="Candara"/>
-                <a:cs typeface="Candara"/>
-              </a:rPr>
-              <a:t>ready</a:t>
-            </a:r>
-            <a:r>
-              <a:rPr lang="en-US" dirty="0">
-                <a:latin typeface="Candara"/>
-                <a:cs typeface="Candara"/>
-              </a:rPr>
-              <a:t>(function() </a:t>
-            </a:r>
-            <a:r>
-              <a:rPr lang="en-US" dirty="0" smtClean="0">
-                <a:latin typeface="Candara"/>
-                <a:cs typeface="Candara"/>
-              </a:rPr>
-              <a:t>{</a:t>
-            </a:r>
-            <a:endParaRPr lang="en-US" dirty="0">
-              <a:latin typeface="Candara"/>
-              <a:cs typeface="Candara"/>
-            </a:endParaRPr>
-          </a:p>
-          <a:p>
-            <a:r>
-              <a:rPr lang="en-US" dirty="0">
-                <a:latin typeface="Candara"/>
-                <a:cs typeface="Candara"/>
-              </a:rPr>
-              <a:t>    </a:t>
-            </a:r>
-            <a:r>
-              <a:rPr lang="en-US" i="1" dirty="0">
-                <a:solidFill>
-                  <a:schemeClr val="tx1">
-                    <a:lumMod val="50000"/>
-                    <a:lumOff val="50000"/>
-                  </a:schemeClr>
-                </a:solidFill>
-                <a:latin typeface="Candara"/>
-                <a:cs typeface="Candara"/>
-              </a:rPr>
-              <a:t>// Your code </a:t>
-            </a:r>
-            <a:r>
-              <a:rPr lang="en-US" i="1" dirty="0" smtClean="0">
-                <a:solidFill>
-                  <a:schemeClr val="tx1">
-                    <a:lumMod val="50000"/>
-                    <a:lumOff val="50000"/>
-                  </a:schemeClr>
-                </a:solidFill>
-                <a:latin typeface="Candara"/>
-                <a:cs typeface="Candara"/>
-              </a:rPr>
-              <a:t>here</a:t>
-            </a:r>
-            <a:endParaRPr lang="en-US" dirty="0">
-              <a:latin typeface="Candara"/>
-              <a:cs typeface="Candara"/>
-            </a:endParaRPr>
-          </a:p>
-          <a:p>
-            <a:r>
-              <a:rPr lang="en-US" dirty="0">
-                <a:latin typeface="Candara"/>
-                <a:cs typeface="Candara"/>
-              </a:rPr>
-              <a:t>});</a:t>
-            </a:r>
-          </a:p>
-        </p:txBody>
-      </p:sp>
-      <p:sp>
-        <p:nvSpPr>
-          <p:cNvPr id="8" name="Rectangle 7"/>
-          <p:cNvSpPr/>
-          <p:nvPr/>
-        </p:nvSpPr>
-        <p:spPr>
-          <a:xfrm>
-            <a:off x="243970" y="2070783"/>
-            <a:ext cx="3454097" cy="1200329"/>
-          </a:xfrm>
-          <a:prstGeom prst="rect">
-            <a:avLst/>
-          </a:prstGeom>
-        </p:spPr>
-        <p:txBody>
-          <a:bodyPr wrap="square">
-            <a:spAutoFit/>
-          </a:bodyPr>
-          <a:lstStyle/>
-          <a:p>
-            <a:pPr algn="just"/>
-            <a:r>
-              <a:rPr lang="en-US" i="1" dirty="0">
-                <a:solidFill>
-                  <a:srgbClr val="7F7F7F"/>
-                </a:solidFill>
-                <a:latin typeface="Candara"/>
-                <a:cs typeface="Candara"/>
-              </a:rPr>
-              <a:t>Unfortunately, the code doesn't run until all images are finished downloading, including banner ads. </a:t>
-            </a:r>
-          </a:p>
-        </p:txBody>
-      </p:sp>
-      <p:sp>
-        <p:nvSpPr>
-          <p:cNvPr id="11" name="Rectangle 10"/>
-          <p:cNvSpPr/>
-          <p:nvPr/>
-        </p:nvSpPr>
-        <p:spPr>
-          <a:xfrm>
-            <a:off x="286382" y="3441680"/>
-            <a:ext cx="8715983" cy="3416320"/>
-          </a:xfrm>
-          <a:prstGeom prst="rect">
-            <a:avLst/>
-          </a:prstGeom>
-        </p:spPr>
-        <p:txBody>
-          <a:bodyPr wrap="square">
-            <a:spAutoFit/>
-          </a:bodyPr>
-          <a:lstStyle/>
-          <a:p>
-            <a:r>
-              <a:rPr lang="en-US" dirty="0"/>
-              <a:t>&lt;body&gt;</a:t>
-            </a:r>
-          </a:p>
-          <a:p>
-            <a:r>
-              <a:rPr lang="en-US" dirty="0"/>
-              <a:t>    &lt;a </a:t>
-            </a:r>
-            <a:r>
-              <a:rPr lang="en-US" dirty="0" err="1"/>
-              <a:t>href</a:t>
-            </a:r>
-            <a:r>
-              <a:rPr lang="en-US" dirty="0"/>
-              <a:t>="http://</a:t>
-            </a:r>
-            <a:r>
-              <a:rPr lang="en-US" dirty="0" err="1"/>
-              <a:t>jquery.com</a:t>
-            </a:r>
-            <a:r>
-              <a:rPr lang="en-US" dirty="0"/>
-              <a:t>/"&gt;</a:t>
-            </a:r>
-            <a:r>
-              <a:rPr lang="en-US" dirty="0" err="1"/>
-              <a:t>jQuery</a:t>
-            </a:r>
-            <a:r>
-              <a:rPr lang="en-US" dirty="0"/>
-              <a:t>&lt;/a&gt;</a:t>
-            </a:r>
-          </a:p>
-          <a:p>
-            <a:r>
-              <a:rPr lang="en-US" dirty="0"/>
-              <a:t>    &lt;script </a:t>
-            </a:r>
-            <a:r>
-              <a:rPr lang="en-US" dirty="0" err="1"/>
-              <a:t>src</a:t>
-            </a:r>
-            <a:r>
-              <a:rPr lang="en-US" dirty="0"/>
-              <a:t>=“https://</a:t>
-            </a:r>
-            <a:r>
-              <a:rPr lang="en-US" dirty="0" err="1"/>
-              <a:t>ajax.googleapis.com</a:t>
-            </a:r>
-            <a:r>
-              <a:rPr lang="en-US" dirty="0"/>
-              <a:t>/</a:t>
-            </a:r>
-            <a:r>
-              <a:rPr lang="en-US" dirty="0" err="1"/>
-              <a:t>ajax</a:t>
-            </a:r>
-            <a:r>
-              <a:rPr lang="en-US" dirty="0"/>
-              <a:t>/libs/</a:t>
-            </a:r>
-            <a:r>
-              <a:rPr lang="en-US" dirty="0" err="1"/>
-              <a:t>jquery</a:t>
-            </a:r>
-            <a:r>
-              <a:rPr lang="en-US" dirty="0"/>
-              <a:t>/2.1.3/</a:t>
-            </a:r>
-            <a:r>
-              <a:rPr lang="en-US" dirty="0" err="1"/>
-              <a:t>jquery.min.js</a:t>
-            </a:r>
-            <a:r>
-              <a:rPr lang="en-US" dirty="0"/>
-              <a:t>"&gt;&lt;/script&gt;</a:t>
-            </a:r>
-          </a:p>
-          <a:p>
-            <a:r>
-              <a:rPr lang="en-US" dirty="0"/>
-              <a:t>    &lt;script</a:t>
-            </a:r>
-            <a:r>
-              <a:rPr lang="en-US" dirty="0" smtClean="0"/>
-              <a:t>&gt;</a:t>
-            </a:r>
-            <a:endParaRPr lang="en-US" dirty="0"/>
-          </a:p>
-          <a:p>
-            <a:r>
-              <a:rPr lang="en-US" dirty="0"/>
-              <a:t>   </a:t>
-            </a:r>
-            <a:r>
-              <a:rPr lang="en-US" dirty="0">
-                <a:solidFill>
-                  <a:srgbClr val="CC3333"/>
-                </a:solidFill>
-              </a:rPr>
-              <a:t> $( document ).ready(function() {</a:t>
-            </a:r>
-          </a:p>
-          <a:p>
-            <a:r>
-              <a:rPr lang="en-US" dirty="0">
-                <a:solidFill>
-                  <a:srgbClr val="CC3333"/>
-                </a:solidFill>
-              </a:rPr>
-              <a:t>        $( "a" ).click(function( event ) {</a:t>
-            </a:r>
-          </a:p>
-          <a:p>
-            <a:r>
-              <a:rPr lang="en-US" dirty="0">
-                <a:solidFill>
-                  <a:srgbClr val="CC3333"/>
-                </a:solidFill>
-              </a:rPr>
-              <a:t>            alert( "The link will no longer take you to </a:t>
-            </a:r>
-            <a:r>
-              <a:rPr lang="en-US" dirty="0" err="1">
-                <a:solidFill>
-                  <a:srgbClr val="CC3333"/>
-                </a:solidFill>
-              </a:rPr>
-              <a:t>jquery.com</a:t>
-            </a:r>
-            <a:r>
-              <a:rPr lang="en-US" dirty="0">
-                <a:solidFill>
-                  <a:srgbClr val="CC3333"/>
-                </a:solidFill>
-              </a:rPr>
-              <a:t>" );</a:t>
-            </a:r>
-          </a:p>
-          <a:p>
-            <a:r>
-              <a:rPr lang="en-US" dirty="0">
-                <a:solidFill>
-                  <a:srgbClr val="CC3333"/>
-                </a:solidFill>
-              </a:rPr>
-              <a:t>            </a:t>
-            </a:r>
-            <a:r>
-              <a:rPr lang="en-US" dirty="0" err="1">
-                <a:solidFill>
-                  <a:srgbClr val="CC3333"/>
-                </a:solidFill>
-              </a:rPr>
-              <a:t>event.preventDefault</a:t>
-            </a:r>
-            <a:r>
-              <a:rPr lang="en-US" dirty="0">
-                <a:solidFill>
-                  <a:srgbClr val="CC3333"/>
-                </a:solidFill>
-              </a:rPr>
-              <a:t>();</a:t>
-            </a:r>
-          </a:p>
-          <a:p>
-            <a:r>
-              <a:rPr lang="en-US" dirty="0">
-                <a:solidFill>
-                  <a:srgbClr val="CC3333"/>
-                </a:solidFill>
-              </a:rPr>
-              <a:t>        });</a:t>
-            </a:r>
-          </a:p>
-          <a:p>
-            <a:r>
-              <a:rPr lang="en-US" dirty="0">
-                <a:solidFill>
-                  <a:srgbClr val="CC3333"/>
-                </a:solidFill>
-              </a:rPr>
-              <a:t>    })</a:t>
-            </a:r>
-            <a:r>
-              <a:rPr lang="en-US" dirty="0" smtClean="0">
-                <a:solidFill>
-                  <a:srgbClr val="CC3333"/>
-                </a:solidFill>
-              </a:rPr>
-              <a:t>;</a:t>
-            </a:r>
-            <a:endParaRPr lang="en-US" dirty="0">
-              <a:solidFill>
-                <a:srgbClr val="CC3333"/>
-              </a:solidFill>
-            </a:endParaRPr>
-          </a:p>
-          <a:p>
-            <a:r>
-              <a:rPr lang="en-US" dirty="0"/>
-              <a:t>    &lt;/script&gt;</a:t>
-            </a:r>
-          </a:p>
-          <a:p>
-            <a:r>
-              <a:rPr lang="en-US" dirty="0"/>
-              <a:t>&lt;/body&gt;</a:t>
-            </a:r>
-          </a:p>
-        </p:txBody>
-      </p:sp>
+      </p:pic>
     </p:spTree>
     <p:extLst>
       <p:ext uri="{BB962C8B-B14F-4D97-AF65-F5344CB8AC3E}">
-        <p14:creationId xmlns:p14="http://schemas.microsoft.com/office/powerpoint/2010/main" val="1365049884"/>
+        <p14:creationId xmlns:p14="http://schemas.microsoft.com/office/powerpoint/2010/main" val="4226930504"/>
       </p:ext>
     </p:extLst>
   </p:cSld>
@@ -9238,7 +9203,7 @@
         <p:spPr>
           <a:xfrm>
             <a:off x="0" y="152402"/>
-            <a:ext cx="1008564" cy="338554"/>
+            <a:ext cx="1332300" cy="338554"/>
           </a:xfrm>
           <a:prstGeom prst="rect">
             <a:avLst/>
@@ -9258,13 +9223,13 @@
           <a:p>
             <a:pPr algn="ctr"/>
             <a:r>
-              <a:rPr lang="en-US" sz="1600" b="1" dirty="0" err="1" smtClean="0">
+              <a:rPr lang="en-US" sz="1600" b="1" dirty="0" smtClean="0">
                 <a:solidFill>
                   <a:schemeClr val="bg1"/>
                 </a:solidFill>
                 <a:latin typeface="Candara" panose="020E0502030303020204" pitchFamily="34" charset="0"/>
               </a:rPr>
-              <a:t>jQUERY</a:t>
+              <a:t>JAVASCRIPT</a:t>
             </a:r>
             <a:endParaRPr lang="en-US" sz="1600" b="1" dirty="0">
               <a:solidFill>
@@ -9283,8 +9248,8 @@
         </p:nvSpPr>
         <p:spPr>
           <a:xfrm>
-            <a:off x="7172009" y="159446"/>
-            <a:ext cx="1979367" cy="338554"/>
+            <a:off x="7919092" y="159446"/>
+            <a:ext cx="1232283" cy="338554"/>
           </a:xfrm>
           <a:prstGeom prst="rect">
             <a:avLst/>
@@ -9307,7 +9272,7 @@
                 </a:solidFill>
                 <a:latin typeface="Candara" panose="020E0502030303020204" pitchFamily="34" charset="0"/>
               </a:rPr>
-              <a:t>DOCUMENT READY</a:t>
+              <a:t>SELECTORS</a:t>
             </a:r>
             <a:endParaRPr lang="en-US" sz="1600" b="1" dirty="0">
               <a:solidFill>
@@ -9318,10 +9283,201 @@
           </a:p>
         </p:txBody>
       </p:sp>
+      <p:sp>
+        <p:nvSpPr>
+          <p:cNvPr id="6" name="Rectangle 5"/>
+          <p:cNvSpPr/>
+          <p:nvPr/>
+        </p:nvSpPr>
+        <p:spPr>
+          <a:xfrm>
+            <a:off x="468095" y="1835720"/>
+            <a:ext cx="3391840" cy="369332"/>
+          </a:xfrm>
+          <a:prstGeom prst="rect">
+            <a:avLst/>
+          </a:prstGeom>
+        </p:spPr>
+        <p:txBody>
+          <a:bodyPr wrap="square">
+            <a:spAutoFit/>
+          </a:bodyPr>
+          <a:lstStyle/>
+          <a:p>
+            <a:r>
+              <a:rPr lang="en-US" dirty="0" err="1">
+                <a:solidFill>
+                  <a:srgbClr val="CC3333"/>
+                </a:solidFill>
+              </a:rPr>
+              <a:t>querySelector</a:t>
+            </a:r>
+            <a:r>
+              <a:rPr lang="en-US" dirty="0">
+                <a:solidFill>
+                  <a:srgbClr val="CC3333"/>
+                </a:solidFill>
+              </a:rPr>
+              <a:t> </a:t>
+            </a:r>
+            <a:r>
+              <a:rPr lang="en-US" dirty="0" smtClean="0"/>
+              <a:t>&amp; </a:t>
+            </a:r>
+            <a:r>
+              <a:rPr lang="en-US" dirty="0" err="1" smtClean="0">
+                <a:solidFill>
+                  <a:srgbClr val="CC3333"/>
+                </a:solidFill>
+              </a:rPr>
+              <a:t>querySelectorAll</a:t>
+            </a:r>
+            <a:r>
+              <a:rPr lang="en-US" dirty="0" smtClean="0">
+                <a:solidFill>
+                  <a:srgbClr val="CC3333"/>
+                </a:solidFill>
+              </a:rPr>
+              <a:t>  </a:t>
+            </a:r>
+            <a:endParaRPr lang="en-US" dirty="0">
+              <a:solidFill>
+                <a:srgbClr val="5B9BD5"/>
+              </a:solidFill>
+            </a:endParaRPr>
+          </a:p>
+        </p:txBody>
+      </p:sp>
+      <p:sp>
+        <p:nvSpPr>
+          <p:cNvPr id="7" name="Rectangle 6"/>
+          <p:cNvSpPr/>
+          <p:nvPr/>
+        </p:nvSpPr>
+        <p:spPr>
+          <a:xfrm>
+            <a:off x="1924907" y="2455273"/>
+            <a:ext cx="6928039" cy="923330"/>
+          </a:xfrm>
+          <a:prstGeom prst="rect">
+            <a:avLst/>
+          </a:prstGeom>
+        </p:spPr>
+        <p:txBody>
+          <a:bodyPr wrap="square">
+            <a:spAutoFit/>
+          </a:bodyPr>
+          <a:lstStyle/>
+          <a:p>
+            <a:r>
+              <a:rPr lang="en-US" dirty="0"/>
+              <a:t>Returns the first element within the document (using depth-first pre-order traversal of the document's nodes) that matches the </a:t>
+            </a:r>
+            <a:r>
+              <a:rPr lang="en-US" dirty="0" smtClean="0"/>
+              <a:t>specified </a:t>
+            </a:r>
+            <a:r>
+              <a:rPr lang="en-US" dirty="0"/>
+              <a:t>group of selectors.</a:t>
+            </a:r>
+          </a:p>
+        </p:txBody>
+      </p:sp>
+      <p:sp>
+        <p:nvSpPr>
+          <p:cNvPr id="8" name="Rectangle 7"/>
+          <p:cNvSpPr/>
+          <p:nvPr/>
+        </p:nvSpPr>
+        <p:spPr>
+          <a:xfrm>
+            <a:off x="2010489" y="4352572"/>
+            <a:ext cx="5432384" cy="369332"/>
+          </a:xfrm>
+          <a:prstGeom prst="rect">
+            <a:avLst/>
+          </a:prstGeom>
+        </p:spPr>
+        <p:txBody>
+          <a:bodyPr wrap="none">
+            <a:spAutoFit/>
+          </a:bodyPr>
+          <a:lstStyle/>
+          <a:p>
+            <a:r>
+              <a:rPr lang="en-US" dirty="0"/>
+              <a:t>Returns a reference to the element by its </a:t>
+            </a:r>
+            <a:r>
+              <a:rPr lang="en-US" dirty="0" smtClean="0"/>
+              <a:t>ID/Class name</a:t>
+            </a:r>
+            <a:endParaRPr lang="en-US" dirty="0"/>
+          </a:p>
+        </p:txBody>
+      </p:sp>
+      <p:sp>
+        <p:nvSpPr>
+          <p:cNvPr id="9" name="Rectangle 8"/>
+          <p:cNvSpPr/>
+          <p:nvPr/>
+        </p:nvSpPr>
+        <p:spPr>
+          <a:xfrm>
+            <a:off x="449216" y="3717513"/>
+            <a:ext cx="4360727" cy="369332"/>
+          </a:xfrm>
+          <a:prstGeom prst="rect">
+            <a:avLst/>
+          </a:prstGeom>
+        </p:spPr>
+        <p:txBody>
+          <a:bodyPr wrap="none">
+            <a:spAutoFit/>
+          </a:bodyPr>
+          <a:lstStyle/>
+          <a:p>
+            <a:r>
+              <a:rPr lang="en-US" dirty="0" err="1">
+                <a:solidFill>
+                  <a:schemeClr val="accent1"/>
+                </a:solidFill>
+              </a:rPr>
+              <a:t>getElementsByClassName</a:t>
+            </a:r>
+            <a:r>
+              <a:rPr lang="en-US" dirty="0">
+                <a:solidFill>
+                  <a:schemeClr val="accent1"/>
+                </a:solidFill>
+              </a:rPr>
+              <a:t> </a:t>
+            </a:r>
+            <a:r>
+              <a:rPr lang="en-US" dirty="0"/>
+              <a:t>&amp; </a:t>
+            </a:r>
+            <a:r>
+              <a:rPr lang="en-US" dirty="0" err="1">
+                <a:solidFill>
+                  <a:srgbClr val="5B9BD5"/>
+                </a:solidFill>
+              </a:rPr>
+              <a:t>getElementById</a:t>
+            </a:r>
+            <a:endParaRPr lang="en-US" dirty="0">
+              <a:solidFill>
+                <a:srgbClr val="5B9BD5"/>
+              </a:solidFill>
+            </a:endParaRPr>
+          </a:p>
+        </p:txBody>
+      </p:sp>
     </p:spTree>
     <p:extLst>
       <p:ext uri="{BB962C8B-B14F-4D97-AF65-F5344CB8AC3E}">
-        <p14:creationId xmlns:p14="http://schemas.microsoft.com/office/powerpoint/2010/main" val="2070659320"/>
+        <p14:creationId xmlns:p14="http://schemas.microsoft.com/office/powerpoint/2010/main" val="1982179937"/>
       </p:ext>
     </p:extLst>
   </p:cSld>
@@ -9389,14 +9545,14 @@
           <a:lstStyle/>
           <a:p>
             <a:r>
-              <a:rPr lang="en-US" sz="2800" b="1" dirty="0" smtClean="0">
+              <a:rPr lang="en-US" sz="2800" b="1" dirty="0" err="1" smtClean="0">
                 <a:solidFill>
                   <a:schemeClr val="bg1"/>
                 </a:solidFill>
                 <a:latin typeface="Candara" panose="020E0502030303020204" pitchFamily="34" charset="0"/>
                 <a:cs typeface="Iskoola Pota" panose="020B0502040204020203" pitchFamily="34" charset="0"/>
               </a:rPr>
-              <a:t>Other JS frameworks</a:t>
+              <a:t>jQuery</a:t>
             </a:r>
             <a:endParaRPr lang="en-US" sz="2800" b="1" dirty="0">
               <a:solidFill>
@@ -9411,7 +9567,1043 @@
     </p:spTree>
     <p:extLst>
       <p:ext uri="{BB962C8B-B14F-4D97-AF65-F5344CB8AC3E}">
-        <p14:creationId xmlns:p14="http://schemas.microsoft.com/office/powerpoint/2010/main" val="207097700"/>
+        <p14:creationId xmlns:p14="http://schemas.microsoft.com/office/powerpoint/2010/main" val="2813627542"/>
+      </p:ext>
+    </p:extLst>
+  </p:cSld>
+  <p:clrMapOvr>
+    <a:masterClrMapping/>
+  </p:clrMapOvr>
+  <p:timing>
+    <p:tnLst>
+      <p:par>
+        <p:cTn xmlns:p14="http://schemas.microsoft.com/office/powerpoint/2010/main" id="1" dur="indefinite" restart="never" nodeType="tmRoot"/>
+      </p:par>
+    </p:tnLst>
+  </p:timing>
+</p:sld>
+</file>
+
+<file path=ppt/slides/slide28.xml><?xml version="1.0" encoding="utf-8"?>
+<p:sld xmlns:a="http://schemas.openxmlformats.org/drawingml/2006/main" xmlns:r="http://schemas.openxmlformats.org/officeDocument/2006/relationships" xmlns:p="http://schemas.openxmlformats.org/presentationml/2006/main">
+  <p:cSld>
+    <p:spTree>
+      <p:nvGrpSpPr>
+        <p:cNvPr id="1" name=""/>
+        <p:cNvGrpSpPr/>
+        <p:nvPr/>
+      </p:nvGrpSpPr>
+      <p:grpSpPr>
+        <a:xfrm>
+          <a:off x="0" y="0"/>
+          <a:ext cx="0" cy="0"/>
+          <a:chOff x="0" y="0"/>
+          <a:chExt cx="0" cy="0"/>
+        </a:xfrm>
+      </p:grpSpPr>
+      <p:sp>
+        <p:nvSpPr>
+          <p:cNvPr id="3" name="TextBox 2"/>
+          <p:cNvSpPr txBox="1"/>
+          <p:nvPr/>
+        </p:nvSpPr>
+        <p:spPr>
+          <a:xfrm>
+            <a:off x="0" y="152402"/>
+            <a:ext cx="1008564" cy="338554"/>
+          </a:xfrm>
+          <a:prstGeom prst="rect">
+            <a:avLst/>
+          </a:prstGeom>
+          <a:solidFill>
+            <a:schemeClr val="tx1">
+              <a:lumMod val="85000"/>
+              <a:lumOff val="15000"/>
+            </a:schemeClr>
+          </a:solidFill>
+        </p:spPr>
+        <p:txBody>
+          <a:bodyPr wrap="square" rtlCol="0">
+            <a:spAutoFit/>
+          </a:bodyPr>
+          <a:lstStyle/>
+          <a:p>
+            <a:pPr algn="ctr"/>
+            <a:r>
+              <a:rPr lang="en-US" sz="1600" b="1" dirty="0" err="1" smtClean="0">
+                <a:solidFill>
+                  <a:schemeClr val="bg1"/>
+                </a:solidFill>
+                <a:latin typeface="Candara" panose="020E0502030303020204" pitchFamily="34" charset="0"/>
+              </a:rPr>
+              <a:t>jQUERY</a:t>
+            </a:r>
+            <a:endParaRPr lang="en-US" sz="1600" b="1" dirty="0">
+              <a:solidFill>
+                <a:schemeClr val="bg1"/>
+              </a:solidFill>
+              <a:latin typeface="Candara" panose="020E0502030303020204" pitchFamily="34" charset="0"/>
+            </a:endParaRPr>
+          </a:p>
+        </p:txBody>
+      </p:sp>
+      <p:sp>
+        <p:nvSpPr>
+          <p:cNvPr id="4" name="TextBox 3"/>
+          <p:cNvSpPr txBox="1"/>
+          <p:nvPr/>
+        </p:nvSpPr>
+        <p:spPr>
+          <a:xfrm>
+            <a:off x="7172009" y="159446"/>
+            <a:ext cx="1979367" cy="338554"/>
+          </a:xfrm>
+          <a:prstGeom prst="rect">
+            <a:avLst/>
+          </a:prstGeom>
+          <a:solidFill>
+            <a:schemeClr val="accent5"/>
+          </a:solidFill>
+        </p:spPr>
+        <p:txBody>
+          <a:bodyPr wrap="square" rtlCol="0">
+            <a:spAutoFit/>
+          </a:bodyPr>
+          <a:lstStyle/>
+          <a:p>
+            <a:pPr algn="ctr"/>
+            <a:r>
+              <a:rPr lang="en-US" sz="1600" b="1" dirty="0" smtClean="0">
+                <a:solidFill>
+                  <a:schemeClr val="bg1"/>
+                </a:solidFill>
+                <a:latin typeface="Candara" panose="020E0502030303020204" pitchFamily="34" charset="0"/>
+              </a:rPr>
+              <a:t>DOCUMENT READY</a:t>
+            </a:r>
+            <a:endParaRPr lang="en-US" sz="1600" b="1" dirty="0">
+              <a:solidFill>
+                <a:schemeClr val="bg1"/>
+              </a:solidFill>
+              <a:latin typeface="Candara" panose="020E0502030303020204" pitchFamily="34" charset="0"/>
+            </a:endParaRPr>
+          </a:p>
+        </p:txBody>
+      </p:sp>
+      <p:sp>
+        <p:nvSpPr>
+          <p:cNvPr id="2" name="Rectangle 1"/>
+          <p:cNvSpPr/>
+          <p:nvPr/>
+        </p:nvSpPr>
+        <p:spPr>
+          <a:xfrm>
+            <a:off x="281324" y="1009302"/>
+            <a:ext cx="3105459" cy="923330"/>
+          </a:xfrm>
+          <a:prstGeom prst="rect">
+            <a:avLst/>
+          </a:prstGeom>
+          <a:ln>
+            <a:solidFill>
+              <a:schemeClr val="tx1">
+                <a:lumMod val="50000"/>
+                <a:lumOff val="50000"/>
+              </a:schemeClr>
+            </a:solidFill>
+          </a:ln>
+        </p:spPr>
+        <p:txBody>
+          <a:bodyPr wrap="square">
+            <a:spAutoFit/>
+          </a:bodyPr>
+          <a:lstStyle/>
+          <a:p>
+            <a:r>
+              <a:rPr lang="en-US" dirty="0" err="1">
+                <a:solidFill>
+                  <a:srgbClr val="CC3333"/>
+                </a:solidFill>
+                <a:latin typeface="Candara"/>
+                <a:cs typeface="Candara"/>
+              </a:rPr>
+              <a:t>window.onload</a:t>
+            </a:r>
+            <a:r>
+              <a:rPr lang="en-US" dirty="0">
+                <a:latin typeface="Candara"/>
+                <a:cs typeface="Candara"/>
+              </a:rPr>
+              <a:t> = function() </a:t>
+            </a:r>
+            <a:r>
+              <a:rPr lang="en-US" dirty="0" smtClean="0">
+                <a:latin typeface="Candara"/>
+                <a:cs typeface="Candara"/>
+              </a:rPr>
+              <a:t>{</a:t>
+            </a:r>
+            <a:endParaRPr lang="en-US" dirty="0">
+              <a:latin typeface="Candara"/>
+              <a:cs typeface="Candara"/>
+            </a:endParaRPr>
+          </a:p>
+          <a:p>
+            <a:r>
+              <a:rPr lang="en-US" dirty="0">
+                <a:latin typeface="Candara"/>
+                <a:cs typeface="Candara"/>
+              </a:rPr>
+              <a:t>    alert( "welcome" )</a:t>
+            </a:r>
+            <a:r>
+              <a:rPr lang="en-US" dirty="0" smtClean="0">
+                <a:latin typeface="Candara"/>
+                <a:cs typeface="Candara"/>
+              </a:rPr>
+              <a:t>;</a:t>
+            </a:r>
+            <a:endParaRPr lang="en-US" dirty="0">
+              <a:latin typeface="Candara"/>
+              <a:cs typeface="Candara"/>
+            </a:endParaRPr>
+          </a:p>
+          <a:p>
+            <a:r>
+              <a:rPr lang="en-US" dirty="0">
+                <a:latin typeface="Candara"/>
+                <a:cs typeface="Candara"/>
+              </a:rPr>
+              <a:t>};</a:t>
+            </a:r>
+          </a:p>
+        </p:txBody>
+      </p:sp>
+      <p:sp>
+        <p:nvSpPr>
+          <p:cNvPr id="6" name="Rectangle 5"/>
+          <p:cNvSpPr/>
+          <p:nvPr/>
+        </p:nvSpPr>
+        <p:spPr>
+          <a:xfrm>
+            <a:off x="3959545" y="2067730"/>
+            <a:ext cx="5080173" cy="923330"/>
+          </a:xfrm>
+          <a:prstGeom prst="rect">
+            <a:avLst/>
+          </a:prstGeom>
+        </p:spPr>
+        <p:txBody>
+          <a:bodyPr wrap="square">
+            <a:spAutoFit/>
+          </a:bodyPr>
+          <a:lstStyle/>
+          <a:p>
+            <a:pPr algn="just"/>
+            <a:r>
+              <a:rPr lang="en-US" i="1" dirty="0" smtClean="0">
+                <a:solidFill>
+                  <a:srgbClr val="7F7F7F"/>
+                </a:solidFill>
+                <a:latin typeface="Candara"/>
+                <a:cs typeface="Candara"/>
+              </a:rPr>
+              <a:t>To </a:t>
+            </a:r>
+            <a:r>
+              <a:rPr lang="en-US" i="1" dirty="0">
+                <a:solidFill>
+                  <a:srgbClr val="7F7F7F"/>
+                </a:solidFill>
+                <a:latin typeface="Candara"/>
+                <a:cs typeface="Candara"/>
+              </a:rPr>
+              <a:t>run code as soon as the document is ready to be manipulated, </a:t>
+            </a:r>
+            <a:r>
+              <a:rPr lang="en-US" i="1" dirty="0" err="1">
+                <a:solidFill>
+                  <a:srgbClr val="CC3333"/>
+                </a:solidFill>
+                <a:latin typeface="Candara"/>
+                <a:cs typeface="Candara"/>
+              </a:rPr>
+              <a:t>jQuery</a:t>
+            </a:r>
+            <a:r>
+              <a:rPr lang="en-US" i="1" dirty="0">
+                <a:solidFill>
+                  <a:srgbClr val="CC3333"/>
+                </a:solidFill>
+                <a:latin typeface="Candara"/>
+                <a:cs typeface="Candara"/>
+              </a:rPr>
+              <a:t> </a:t>
+            </a:r>
+            <a:r>
+              <a:rPr lang="en-US" i="1" dirty="0">
+                <a:solidFill>
+                  <a:srgbClr val="7F7F7F"/>
+                </a:solidFill>
+                <a:latin typeface="Candara"/>
+                <a:cs typeface="Candara"/>
+              </a:rPr>
+              <a:t>has a statement known as the ready </a:t>
+            </a:r>
+            <a:r>
+              <a:rPr lang="en-US" i="1" dirty="0" smtClean="0">
+                <a:solidFill>
+                  <a:srgbClr val="7F7F7F"/>
+                </a:solidFill>
+                <a:latin typeface="Candara"/>
+                <a:cs typeface="Candara"/>
+              </a:rPr>
+              <a:t>event:</a:t>
+            </a:r>
+            <a:endParaRPr lang="en-US" i="1" dirty="0">
+              <a:solidFill>
+                <a:srgbClr val="7F7F7F"/>
+              </a:solidFill>
+              <a:latin typeface="Candara"/>
+              <a:cs typeface="Candara"/>
+            </a:endParaRPr>
+          </a:p>
+        </p:txBody>
+      </p:sp>
+      <p:sp>
+        <p:nvSpPr>
+          <p:cNvPr id="7" name="Rectangle 6"/>
+          <p:cNvSpPr/>
+          <p:nvPr/>
+        </p:nvSpPr>
+        <p:spPr>
+          <a:xfrm>
+            <a:off x="4178613" y="984396"/>
+            <a:ext cx="4572000" cy="923330"/>
+          </a:xfrm>
+          <a:prstGeom prst="rect">
+            <a:avLst/>
+          </a:prstGeom>
+          <a:ln>
+            <a:solidFill>
+              <a:srgbClr val="7F7F7F"/>
+            </a:solidFill>
+          </a:ln>
+        </p:spPr>
+        <p:txBody>
+          <a:bodyPr>
+            <a:spAutoFit/>
+          </a:bodyPr>
+          <a:lstStyle/>
+          <a:p>
+            <a:r>
+              <a:rPr lang="en-US" dirty="0">
+                <a:latin typeface="Candara"/>
+                <a:cs typeface="Candara"/>
+              </a:rPr>
+              <a:t>$( document ).</a:t>
+            </a:r>
+            <a:r>
+              <a:rPr lang="en-US" dirty="0">
+                <a:solidFill>
+                  <a:srgbClr val="CC3333"/>
+                </a:solidFill>
+                <a:latin typeface="Candara"/>
+                <a:cs typeface="Candara"/>
+              </a:rPr>
+              <a:t>ready</a:t>
+            </a:r>
+            <a:r>
+              <a:rPr lang="en-US" dirty="0">
+                <a:latin typeface="Candara"/>
+                <a:cs typeface="Candara"/>
+              </a:rPr>
+              <a:t>(function() </a:t>
+            </a:r>
+            <a:r>
+              <a:rPr lang="en-US" dirty="0" smtClean="0">
+                <a:latin typeface="Candara"/>
+                <a:cs typeface="Candara"/>
+              </a:rPr>
+              <a:t>{</a:t>
+            </a:r>
+            <a:endParaRPr lang="en-US" dirty="0">
+              <a:latin typeface="Candara"/>
+              <a:cs typeface="Candara"/>
+            </a:endParaRPr>
+          </a:p>
+          <a:p>
+            <a:r>
+              <a:rPr lang="en-US" dirty="0">
+                <a:latin typeface="Candara"/>
+                <a:cs typeface="Candara"/>
+              </a:rPr>
+              <a:t>    </a:t>
+            </a:r>
+            <a:r>
+              <a:rPr lang="en-US" i="1" dirty="0">
+                <a:solidFill>
+                  <a:schemeClr val="tx1">
+                    <a:lumMod val="50000"/>
+                    <a:lumOff val="50000"/>
+                  </a:schemeClr>
+                </a:solidFill>
+                <a:latin typeface="Candara"/>
+                <a:cs typeface="Candara"/>
+              </a:rPr>
+              <a:t>// Your code </a:t>
+            </a:r>
+            <a:r>
+              <a:rPr lang="en-US" i="1" dirty="0" smtClean="0">
+                <a:solidFill>
+                  <a:schemeClr val="tx1">
+                    <a:lumMod val="50000"/>
+                    <a:lumOff val="50000"/>
+                  </a:schemeClr>
+                </a:solidFill>
+                <a:latin typeface="Candara"/>
+                <a:cs typeface="Candara"/>
+              </a:rPr>
+              <a:t>here</a:t>
+            </a:r>
+            <a:endParaRPr lang="en-US" dirty="0">
+              <a:latin typeface="Candara"/>
+              <a:cs typeface="Candara"/>
+            </a:endParaRPr>
+          </a:p>
+          <a:p>
+            <a:r>
+              <a:rPr lang="en-US" dirty="0">
+                <a:latin typeface="Candara"/>
+                <a:cs typeface="Candara"/>
+              </a:rPr>
+              <a:t>});</a:t>
+            </a:r>
+          </a:p>
+        </p:txBody>
+      </p:sp>
+      <p:sp>
+        <p:nvSpPr>
+          <p:cNvPr id="8" name="Rectangle 7"/>
+          <p:cNvSpPr/>
+          <p:nvPr/>
+        </p:nvSpPr>
+        <p:spPr>
+          <a:xfrm>
+            <a:off x="243970" y="2070783"/>
+            <a:ext cx="3454097" cy="1200329"/>
+          </a:xfrm>
+          <a:prstGeom prst="rect">
+            <a:avLst/>
+          </a:prstGeom>
+        </p:spPr>
+        <p:txBody>
+          <a:bodyPr wrap="square">
+            <a:spAutoFit/>
+          </a:bodyPr>
+          <a:lstStyle/>
+          <a:p>
+            <a:pPr algn="just"/>
+            <a:r>
+              <a:rPr lang="en-US" i="1" dirty="0">
+                <a:solidFill>
+                  <a:srgbClr val="7F7F7F"/>
+                </a:solidFill>
+                <a:latin typeface="Candara"/>
+                <a:cs typeface="Candara"/>
+              </a:rPr>
+              <a:t>Unfortunately, the code doesn't run until all images are finished downloading, including banner ads. </a:t>
+            </a:r>
+          </a:p>
+        </p:txBody>
+      </p:sp>
+      <p:sp>
+        <p:nvSpPr>
+          <p:cNvPr id="11" name="Rectangle 10"/>
+          <p:cNvSpPr/>
+          <p:nvPr/>
+        </p:nvSpPr>
+        <p:spPr>
+          <a:xfrm>
+            <a:off x="286382" y="3441680"/>
+            <a:ext cx="8715983" cy="3416320"/>
+          </a:xfrm>
+          <a:prstGeom prst="rect">
+            <a:avLst/>
+          </a:prstGeom>
+        </p:spPr>
+        <p:txBody>
+          <a:bodyPr wrap="square">
+            <a:spAutoFit/>
+          </a:bodyPr>
+          <a:lstStyle/>
+          <a:p>
+            <a:r>
+              <a:rPr lang="en-US" dirty="0"/>
+              <a:t>&lt;body&gt;</a:t>
+            </a:r>
+          </a:p>
+          <a:p>
+            <a:r>
+              <a:rPr lang="en-US" dirty="0"/>
+              <a:t>    &lt;a </a:t>
+            </a:r>
+            <a:r>
+              <a:rPr lang="en-US" dirty="0" err="1"/>
+              <a:t>href</a:t>
+            </a:r>
+            <a:r>
+              <a:rPr lang="en-US" dirty="0"/>
+              <a:t>="http://</a:t>
+            </a:r>
+            <a:r>
+              <a:rPr lang="en-US" dirty="0" err="1"/>
+              <a:t>jquery.com</a:t>
+            </a:r>
+            <a:r>
+              <a:rPr lang="en-US" dirty="0"/>
+              <a:t>/"&gt;</a:t>
+            </a:r>
+            <a:r>
+              <a:rPr lang="en-US" dirty="0" err="1"/>
+              <a:t>jQuery</a:t>
+            </a:r>
+            <a:r>
+              <a:rPr lang="en-US" dirty="0"/>
+              <a:t>&lt;/a&gt;</a:t>
+            </a:r>
+          </a:p>
+          <a:p>
+            <a:r>
+              <a:rPr lang="en-US" dirty="0"/>
+              <a:t>    &lt;script </a:t>
+            </a:r>
+            <a:r>
+              <a:rPr lang="en-US" dirty="0" err="1"/>
+              <a:t>src</a:t>
+            </a:r>
+            <a:r>
+              <a:rPr lang="en-US" dirty="0"/>
+              <a:t>=“https://</a:t>
+            </a:r>
+            <a:r>
+              <a:rPr lang="en-US" dirty="0" err="1"/>
+              <a:t>ajax.googleapis.com</a:t>
+            </a:r>
+            <a:r>
+              <a:rPr lang="en-US" dirty="0"/>
+              <a:t>/</a:t>
+            </a:r>
+            <a:r>
+              <a:rPr lang="en-US" dirty="0" err="1"/>
+              <a:t>ajax</a:t>
+            </a:r>
+            <a:r>
+              <a:rPr lang="en-US" dirty="0"/>
+              <a:t>/libs/</a:t>
+            </a:r>
+            <a:r>
+              <a:rPr lang="en-US" dirty="0" err="1"/>
+              <a:t>jquery</a:t>
+            </a:r>
+            <a:r>
+              <a:rPr lang="en-US" dirty="0"/>
+              <a:t>/2.1.3/</a:t>
+            </a:r>
+            <a:r>
+              <a:rPr lang="en-US" dirty="0" err="1"/>
+              <a:t>jquery.min.js</a:t>
+            </a:r>
+            <a:r>
+              <a:rPr lang="en-US" dirty="0"/>
+              <a:t>"&gt;&lt;/script&gt;</a:t>
+            </a:r>
+          </a:p>
+          <a:p>
+            <a:r>
+              <a:rPr lang="en-US" dirty="0"/>
+              <a:t>    &lt;script</a:t>
+            </a:r>
+            <a:r>
+              <a:rPr lang="en-US" dirty="0" smtClean="0"/>
+              <a:t>&gt;</a:t>
+            </a:r>
+            <a:endParaRPr lang="en-US" dirty="0"/>
+          </a:p>
+          <a:p>
+            <a:r>
+              <a:rPr lang="en-US" dirty="0"/>
+              <a:t>   </a:t>
+            </a:r>
+            <a:r>
+              <a:rPr lang="en-US" dirty="0">
+                <a:solidFill>
+                  <a:srgbClr val="CC3333"/>
+                </a:solidFill>
+              </a:rPr>
+              <a:t> $( document ).ready(function() {</a:t>
+            </a:r>
+          </a:p>
+          <a:p>
+            <a:r>
+              <a:rPr lang="en-US" dirty="0">
+                <a:solidFill>
+                  <a:srgbClr val="CC3333"/>
+                </a:solidFill>
+              </a:rPr>
+              <a:t>        $( "a" ).click(function( event ) {</a:t>
+            </a:r>
+          </a:p>
+          <a:p>
+            <a:r>
+              <a:rPr lang="en-US" dirty="0">
+                <a:solidFill>
+                  <a:srgbClr val="CC3333"/>
+                </a:solidFill>
+              </a:rPr>
+              <a:t>            alert( "The link will no longer take you to </a:t>
+            </a:r>
+            <a:r>
+              <a:rPr lang="en-US" dirty="0" err="1">
+                <a:solidFill>
+                  <a:srgbClr val="CC3333"/>
+                </a:solidFill>
+              </a:rPr>
+              <a:t>jquery.com</a:t>
+            </a:r>
+            <a:r>
+              <a:rPr lang="en-US" dirty="0">
+                <a:solidFill>
+                  <a:srgbClr val="CC3333"/>
+                </a:solidFill>
+              </a:rPr>
+              <a:t>" );</a:t>
+            </a:r>
+          </a:p>
+          <a:p>
+            <a:r>
+              <a:rPr lang="en-US" dirty="0">
+                <a:solidFill>
+                  <a:srgbClr val="CC3333"/>
+                </a:solidFill>
+              </a:rPr>
+              <a:t>            </a:t>
+            </a:r>
+            <a:r>
+              <a:rPr lang="en-US" dirty="0" err="1">
+                <a:solidFill>
+                  <a:srgbClr val="CC3333"/>
+                </a:solidFill>
+              </a:rPr>
+              <a:t>event.preventDefault</a:t>
+            </a:r>
+            <a:r>
+              <a:rPr lang="en-US" dirty="0">
+                <a:solidFill>
+                  <a:srgbClr val="CC3333"/>
+                </a:solidFill>
+              </a:rPr>
+              <a:t>();</a:t>
+            </a:r>
+          </a:p>
+          <a:p>
+            <a:r>
+              <a:rPr lang="en-US" dirty="0">
+                <a:solidFill>
+                  <a:srgbClr val="CC3333"/>
+                </a:solidFill>
+              </a:rPr>
+              <a:t>        });</a:t>
+            </a:r>
+          </a:p>
+          <a:p>
+            <a:r>
+              <a:rPr lang="en-US" dirty="0">
+                <a:solidFill>
+                  <a:srgbClr val="CC3333"/>
+                </a:solidFill>
+              </a:rPr>
+              <a:t>    })</a:t>
+            </a:r>
+            <a:r>
+              <a:rPr lang="en-US" dirty="0" smtClean="0">
+                <a:solidFill>
+                  <a:srgbClr val="CC3333"/>
+                </a:solidFill>
+              </a:rPr>
+              <a:t>;</a:t>
+            </a:r>
+            <a:endParaRPr lang="en-US" dirty="0">
+              <a:solidFill>
+                <a:srgbClr val="CC3333"/>
+              </a:solidFill>
+            </a:endParaRPr>
+          </a:p>
+          <a:p>
+            <a:r>
+              <a:rPr lang="en-US" dirty="0"/>
+              <a:t>    &lt;/script&gt;</a:t>
+            </a:r>
+          </a:p>
+          <a:p>
+            <a:r>
+              <a:rPr lang="en-US" dirty="0"/>
+              <a:t>&lt;/body&gt;</a:t>
+            </a:r>
+          </a:p>
+        </p:txBody>
+      </p:sp>
+    </p:spTree>
+    <p:extLst>
+      <p:ext uri="{BB962C8B-B14F-4D97-AF65-F5344CB8AC3E}">
+        <p14:creationId xmlns:p14="http://schemas.microsoft.com/office/powerpoint/2010/main" val="1365049884"/>
+      </p:ext>
+    </p:extLst>
+  </p:cSld>
+  <p:clrMapOvr>
+    <a:masterClrMapping/>
+  </p:clrMapOvr>
+  <p:timing>
+    <p:tnLst>
+      <p:par>
+        <p:cTn xmlns:p14="http://schemas.microsoft.com/office/powerpoint/2010/main" id="1" dur="indefinite" restart="never" nodeType="tmRoot"/>
+      </p:par>
+    </p:tnLst>
+  </p:timing>
+</p:sld>
+</file>
+
+<file path=ppt/slides/slide29.xml><?xml version="1.0" encoding="utf-8"?>
+<p:sld xmlns:a="http://schemas.openxmlformats.org/drawingml/2006/main" xmlns:r="http://schemas.openxmlformats.org/officeDocument/2006/relationships" xmlns:p="http://schemas.openxmlformats.org/presentationml/2006/main">
+  <p:cSld>
+    <p:spTree>
+      <p:nvGrpSpPr>
+        <p:cNvPr id="1" name=""/>
+        <p:cNvGrpSpPr/>
+        <p:nvPr/>
+      </p:nvGrpSpPr>
+      <p:grpSpPr>
+        <a:xfrm>
+          <a:off x="0" y="0"/>
+          <a:ext cx="0" cy="0"/>
+          <a:chOff x="0" y="0"/>
+          <a:chExt cx="0" cy="0"/>
+        </a:xfrm>
+      </p:grpSpPr>
+      <p:sp>
+        <p:nvSpPr>
+          <p:cNvPr id="3" name="TextBox 2"/>
+          <p:cNvSpPr txBox="1"/>
+          <p:nvPr/>
+        </p:nvSpPr>
+        <p:spPr>
+          <a:xfrm>
+            <a:off x="0" y="152402"/>
+            <a:ext cx="1008564" cy="338554"/>
+          </a:xfrm>
+          <a:prstGeom prst="rect">
+            <a:avLst/>
+          </a:prstGeom>
+          <a:solidFill>
+            <a:schemeClr val="tx1">
+              <a:lumMod val="85000"/>
+              <a:lumOff val="15000"/>
+            </a:schemeClr>
+          </a:solidFill>
+        </p:spPr>
+        <p:txBody>
+          <a:bodyPr wrap="square" rtlCol="0">
+            <a:spAutoFit/>
+          </a:bodyPr>
+          <a:lstStyle/>
+          <a:p>
+            <a:pPr algn="ctr"/>
+            <a:r>
+              <a:rPr lang="en-US" sz="1600" b="1" dirty="0" err="1" smtClean="0">
+                <a:solidFill>
+                  <a:schemeClr val="bg1"/>
+                </a:solidFill>
+                <a:latin typeface="Candara" panose="020E0502030303020204" pitchFamily="34" charset="0"/>
+              </a:rPr>
+              <a:t>jQUERY</a:t>
+            </a:r>
+            <a:endParaRPr lang="en-US" sz="1600" b="1" dirty="0">
+              <a:solidFill>
+                <a:schemeClr val="bg1"/>
+              </a:solidFill>
+              <a:latin typeface="Candara" panose="020E0502030303020204" pitchFamily="34" charset="0"/>
+            </a:endParaRPr>
+          </a:p>
+        </p:txBody>
+      </p:sp>
+      <p:sp>
+        <p:nvSpPr>
+          <p:cNvPr id="4" name="TextBox 3"/>
+          <p:cNvSpPr txBox="1"/>
+          <p:nvPr/>
+        </p:nvSpPr>
+        <p:spPr>
+          <a:xfrm>
+            <a:off x="7856836" y="159446"/>
+            <a:ext cx="1294540" cy="338554"/>
+          </a:xfrm>
+          <a:prstGeom prst="rect">
+            <a:avLst/>
+          </a:prstGeom>
+          <a:solidFill>
+            <a:schemeClr val="accent5"/>
+          </a:solidFill>
+        </p:spPr>
+        <p:txBody>
+          <a:bodyPr wrap="square" rtlCol="0">
+            <a:spAutoFit/>
+          </a:bodyPr>
+          <a:lstStyle/>
+          <a:p>
+            <a:pPr algn="ctr"/>
+            <a:r>
+              <a:rPr lang="en-US" sz="1600" b="1" dirty="0" smtClean="0">
+                <a:solidFill>
+                  <a:schemeClr val="bg1"/>
+                </a:solidFill>
+                <a:latin typeface="Candara" panose="020E0502030303020204" pitchFamily="34" charset="0"/>
+              </a:rPr>
+              <a:t>CLASSES</a:t>
+            </a:r>
+            <a:endParaRPr lang="en-US" sz="1600" b="1" dirty="0">
+              <a:solidFill>
+                <a:schemeClr val="bg1"/>
+              </a:solidFill>
+              <a:latin typeface="Candara" panose="020E0502030303020204" pitchFamily="34" charset="0"/>
+            </a:endParaRPr>
+          </a:p>
+        </p:txBody>
+      </p:sp>
+      <p:sp>
+        <p:nvSpPr>
+          <p:cNvPr id="5" name="Rectangle 4"/>
+          <p:cNvSpPr/>
+          <p:nvPr/>
+        </p:nvSpPr>
+        <p:spPr>
+          <a:xfrm>
+            <a:off x="808564" y="1613107"/>
+            <a:ext cx="3273515" cy="369332"/>
+          </a:xfrm>
+          <a:prstGeom prst="rect">
+            <a:avLst/>
+          </a:prstGeom>
+        </p:spPr>
+        <p:txBody>
+          <a:bodyPr wrap="none">
+            <a:spAutoFit/>
+          </a:bodyPr>
+          <a:lstStyle/>
+          <a:p>
+            <a:r>
+              <a:rPr lang="nb-NO" dirty="0">
+                <a:latin typeface="Candara"/>
+                <a:cs typeface="Candara"/>
+              </a:rPr>
+              <a:t>$( </a:t>
+            </a:r>
+            <a:r>
+              <a:rPr lang="nb-NO" dirty="0" smtClean="0">
+                <a:latin typeface="Candara"/>
+                <a:cs typeface="Candara"/>
+              </a:rPr>
+              <a:t>”#demo" </a:t>
+            </a:r>
+            <a:r>
+              <a:rPr lang="nb-NO" dirty="0">
+                <a:latin typeface="Candara"/>
+                <a:cs typeface="Candara"/>
+              </a:rPr>
+              <a:t>).</a:t>
+            </a:r>
+            <a:r>
+              <a:rPr lang="nb-NO" dirty="0" err="1">
+                <a:solidFill>
+                  <a:srgbClr val="CC3333"/>
+                </a:solidFill>
+                <a:latin typeface="Candara"/>
+                <a:cs typeface="Candara"/>
+              </a:rPr>
+              <a:t>addClass</a:t>
+            </a:r>
+            <a:r>
+              <a:rPr lang="nb-NO" dirty="0">
+                <a:latin typeface="Candara"/>
+                <a:cs typeface="Candara"/>
+              </a:rPr>
+              <a:t>( "test" );</a:t>
+            </a:r>
+            <a:endParaRPr lang="en-US" dirty="0">
+              <a:latin typeface="Candara"/>
+              <a:cs typeface="Candara"/>
+            </a:endParaRPr>
+          </a:p>
+        </p:txBody>
+      </p:sp>
+      <p:sp>
+        <p:nvSpPr>
+          <p:cNvPr id="9" name="Rectangle 8"/>
+          <p:cNvSpPr/>
+          <p:nvPr/>
+        </p:nvSpPr>
+        <p:spPr>
+          <a:xfrm>
+            <a:off x="5007739" y="1625560"/>
+            <a:ext cx="3752763" cy="369332"/>
+          </a:xfrm>
+          <a:prstGeom prst="rect">
+            <a:avLst/>
+          </a:prstGeom>
+        </p:spPr>
+        <p:txBody>
+          <a:bodyPr wrap="none">
+            <a:spAutoFit/>
+          </a:bodyPr>
+          <a:lstStyle/>
+          <a:p>
+            <a:r>
+              <a:rPr lang="en-US" dirty="0">
+                <a:latin typeface="Candara"/>
+                <a:cs typeface="Candara"/>
+              </a:rPr>
+              <a:t>$( </a:t>
+            </a:r>
+            <a:r>
+              <a:rPr lang="en-US" dirty="0" smtClean="0">
+                <a:latin typeface="Candara"/>
+                <a:cs typeface="Candara"/>
+              </a:rPr>
+              <a:t>”#demo" </a:t>
+            </a:r>
+            <a:r>
+              <a:rPr lang="en-US" dirty="0">
+                <a:latin typeface="Candara"/>
+                <a:cs typeface="Candara"/>
+              </a:rPr>
+              <a:t>).</a:t>
+            </a:r>
+            <a:r>
+              <a:rPr lang="en-US" dirty="0" err="1">
+                <a:solidFill>
+                  <a:srgbClr val="CC3333"/>
+                </a:solidFill>
+                <a:latin typeface="Candara"/>
+                <a:cs typeface="Candara"/>
+              </a:rPr>
+              <a:t>removeClass</a:t>
+            </a:r>
+            <a:r>
+              <a:rPr lang="en-US" dirty="0">
+                <a:latin typeface="Candara"/>
+                <a:cs typeface="Candara"/>
+              </a:rPr>
+              <a:t>( "test" );</a:t>
+            </a:r>
+          </a:p>
+        </p:txBody>
+      </p:sp>
+      <p:sp>
+        <p:nvSpPr>
+          <p:cNvPr id="10" name="Rectangle 9"/>
+          <p:cNvSpPr/>
+          <p:nvPr/>
+        </p:nvSpPr>
+        <p:spPr>
+          <a:xfrm>
+            <a:off x="2575130" y="3194526"/>
+            <a:ext cx="4525059" cy="646331"/>
+          </a:xfrm>
+          <a:prstGeom prst="rect">
+            <a:avLst/>
+          </a:prstGeom>
+        </p:spPr>
+        <p:txBody>
+          <a:bodyPr wrap="none">
+            <a:spAutoFit/>
+          </a:bodyPr>
+          <a:lstStyle/>
+          <a:p>
+            <a:r>
+              <a:rPr lang="nb-NO" dirty="0" smtClean="0">
+                <a:latin typeface="Candara"/>
+                <a:cs typeface="Candara"/>
+              </a:rPr>
+              <a:t>var d = </a:t>
+            </a:r>
+            <a:r>
+              <a:rPr lang="nb-NO" dirty="0" err="1" smtClean="0">
+                <a:latin typeface="Candara"/>
+                <a:cs typeface="Candara"/>
+              </a:rPr>
+              <a:t>document.getElementById</a:t>
+            </a:r>
+            <a:r>
+              <a:rPr lang="nb-NO" dirty="0" smtClean="0">
+                <a:latin typeface="Candara"/>
+                <a:cs typeface="Candara"/>
+              </a:rPr>
+              <a:t>(”demo”);</a:t>
+            </a:r>
+          </a:p>
+          <a:p>
+            <a:r>
+              <a:rPr lang="nb-NO" dirty="0" err="1" smtClean="0">
+                <a:solidFill>
+                  <a:schemeClr val="accent1"/>
+                </a:solidFill>
+                <a:latin typeface="Candara"/>
+                <a:cs typeface="Candara"/>
+              </a:rPr>
+              <a:t>d.className</a:t>
+            </a:r>
+            <a:r>
+              <a:rPr lang="nb-NO" dirty="0" smtClean="0">
+                <a:solidFill>
+                  <a:schemeClr val="accent1"/>
+                </a:solidFill>
+                <a:latin typeface="Candara"/>
+                <a:cs typeface="Candara"/>
+              </a:rPr>
+              <a:t> </a:t>
+            </a:r>
+            <a:r>
+              <a:rPr lang="nb-NO" dirty="0" smtClean="0">
+                <a:latin typeface="Candara"/>
+                <a:cs typeface="Candara"/>
+              </a:rPr>
+              <a:t>= </a:t>
+            </a:r>
+            <a:r>
+              <a:rPr lang="nb-NO" dirty="0" err="1" smtClean="0">
+                <a:latin typeface="Candara"/>
+                <a:cs typeface="Candara"/>
+              </a:rPr>
+              <a:t>className</a:t>
+            </a:r>
+            <a:r>
+              <a:rPr lang="nb-NO" dirty="0" smtClean="0">
+                <a:latin typeface="Candara"/>
+                <a:cs typeface="Candara"/>
+              </a:rPr>
+              <a:t> + test;</a:t>
+            </a:r>
+            <a:endParaRPr lang="en-US" dirty="0">
+              <a:latin typeface="Candara"/>
+              <a:cs typeface="Candara"/>
+            </a:endParaRPr>
+          </a:p>
+        </p:txBody>
+      </p:sp>
+    </p:spTree>
+    <p:extLst>
+      <p:ext uri="{BB962C8B-B14F-4D97-AF65-F5344CB8AC3E}">
+        <p14:creationId xmlns:p14="http://schemas.microsoft.com/office/powerpoint/2010/main" val="3894239493"/>
       </p:ext>
     </p:extLst>
   </p:cSld>
@@ -9567,6 +10759,222 @@
     <p:extLst>
       <p:ext uri="{BB962C8B-B14F-4D97-AF65-F5344CB8AC3E}">
         <p14:creationId xmlns:p14="http://schemas.microsoft.com/office/powerpoint/2010/main" val="2085627161"/>
+      </p:ext>
+    </p:extLst>
+  </p:cSld>
+  <p:clrMapOvr>
+    <a:masterClrMapping/>
+  </p:clrMapOvr>
+  <p:timing>
+    <p:tnLst>
+      <p:par>
+        <p:cTn xmlns:p14="http://schemas.microsoft.com/office/powerpoint/2010/main" id="1" dur="indefinite" restart="never" nodeType="tmRoot"/>
+      </p:par>
+    </p:tnLst>
+  </p:timing>
+</p:sld>
+</file>
+
+<file path=ppt/slides/slide30.xml><?xml version="1.0" encoding="utf-8"?>
+<p:sld xmlns:a="http://schemas.openxmlformats.org/drawingml/2006/main" xmlns:r="http://schemas.openxmlformats.org/officeDocument/2006/relationships" xmlns:p="http://schemas.openxmlformats.org/presentationml/2006/main">
+  <p:cSld>
+    <p:spTree>
+      <p:nvGrpSpPr>
+        <p:cNvPr id="1" name=""/>
+        <p:cNvGrpSpPr/>
+        <p:nvPr/>
+      </p:nvGrpSpPr>
+      <p:grpSpPr>
+        <a:xfrm>
+          <a:off x="0" y="0"/>
+          <a:ext cx="0" cy="0"/>
+          <a:chOff x="0" y="0"/>
+          <a:chExt cx="0" cy="0"/>
+        </a:xfrm>
+      </p:grpSpPr>
+      <p:sp>
+        <p:nvSpPr>
+          <p:cNvPr id="3" name="TextBox 2"/>
+          <p:cNvSpPr txBox="1"/>
+          <p:nvPr/>
+        </p:nvSpPr>
+        <p:spPr>
+          <a:xfrm>
+            <a:off x="0" y="152402"/>
+            <a:ext cx="1008564" cy="338554"/>
+          </a:xfrm>
+          <a:prstGeom prst="rect">
+            <a:avLst/>
+          </a:prstGeom>
+          <a:solidFill>
+            <a:schemeClr val="tx1">
+              <a:lumMod val="85000"/>
+              <a:lumOff val="15000"/>
+            </a:schemeClr>
+          </a:solidFill>
+        </p:spPr>
+        <p:txBody>
+          <a:bodyPr wrap="square" rtlCol="0">
+            <a:spAutoFit/>
+          </a:bodyPr>
+          <a:lstStyle/>
+          <a:p>
+            <a:pPr algn="ctr"/>
+            <a:r>
+              <a:rPr lang="en-US" sz="1600" b="1" dirty="0" err="1" smtClean="0">
+                <a:solidFill>
+                  <a:schemeClr val="bg1"/>
+                </a:solidFill>
+                <a:latin typeface="Candara" panose="020E0502030303020204" pitchFamily="34" charset="0"/>
+              </a:rPr>
+              <a:t>jQUERY</a:t>
+            </a:r>
+            <a:endParaRPr lang="en-US" sz="1600" b="1" dirty="0">
+              <a:solidFill>
+                <a:schemeClr val="bg1"/>
+              </a:solidFill>
+              <a:latin typeface="Candara" panose="020E0502030303020204" pitchFamily="34" charset="0"/>
+            </a:endParaRPr>
+          </a:p>
+        </p:txBody>
+      </p:sp>
+      <p:sp>
+        <p:nvSpPr>
+          <p:cNvPr id="4" name="TextBox 3"/>
+          <p:cNvSpPr txBox="1"/>
+          <p:nvPr/>
+        </p:nvSpPr>
+        <p:spPr>
+          <a:xfrm>
+            <a:off x="8205474" y="159446"/>
+            <a:ext cx="945901" cy="338554"/>
+          </a:xfrm>
+          <a:prstGeom prst="rect">
+            <a:avLst/>
+          </a:prstGeom>
+          <a:solidFill>
+            <a:schemeClr val="accent5"/>
+          </a:solidFill>
+        </p:spPr>
+        <p:txBody>
+          <a:bodyPr wrap="square" rtlCol="0">
+            <a:spAutoFit/>
+          </a:bodyPr>
+          <a:lstStyle/>
+          <a:p>
+            <a:pPr algn="ctr"/>
+            <a:r>
+              <a:rPr lang="en-US" sz="1600" b="1" dirty="0" smtClean="0">
+                <a:solidFill>
+                  <a:schemeClr val="bg1"/>
+                </a:solidFill>
+                <a:latin typeface="Candara" panose="020E0502030303020204" pitchFamily="34" charset="0"/>
+              </a:rPr>
+              <a:t>AJAX</a:t>
+            </a:r>
+            <a:endParaRPr lang="en-US" sz="1600" b="1" dirty="0">
+              <a:solidFill>
+                <a:schemeClr val="bg1"/>
+              </a:solidFill>
+              <a:latin typeface="Candara" panose="020E0502030303020204" pitchFamily="34" charset="0"/>
+            </a:endParaRPr>
+          </a:p>
+        </p:txBody>
+      </p:sp>
+    </p:spTree>
+    <p:extLst>
+      <p:ext uri="{BB962C8B-B14F-4D97-AF65-F5344CB8AC3E}">
+        <p14:creationId xmlns:p14="http://schemas.microsoft.com/office/powerpoint/2010/main" val="2111447974"/>
+      </p:ext>
+    </p:extLst>
+  </p:cSld>
+  <p:clrMapOvr>
+    <a:masterClrMapping/>
+  </p:clrMapOvr>
+  <p:timing>
+    <p:tnLst>
+      <p:par>
+        <p:cTn xmlns:p14="http://schemas.microsoft.com/office/powerpoint/2010/main" id="1" dur="indefinite" restart="never" nodeType="tmRoot"/>
+      </p:par>
+    </p:tnLst>
+  </p:timing>
+</p:sld>
+</file>
+
+<file path=ppt/slides/slide31.xml><?xml version="1.0" encoding="utf-8"?>
+<p:sld xmlns:a="http://schemas.openxmlformats.org/drawingml/2006/main" xmlns:r="http://schemas.openxmlformats.org/officeDocument/2006/relationships" xmlns:p="http://schemas.openxmlformats.org/presentationml/2006/main">
+  <p:cSld>
+    <p:bg>
+      <p:bgPr>
+        <a:solidFill>
+          <a:schemeClr val="tx1">
+            <a:lumMod val="85000"/>
+            <a:lumOff val="15000"/>
+          </a:schemeClr>
+        </a:solidFill>
+        <a:effectLst/>
+      </p:bgPr>
+    </p:bg>
+    <p:spTree>
+      <p:nvGrpSpPr>
+        <p:cNvPr id="1" name=""/>
+        <p:cNvGrpSpPr/>
+        <p:nvPr/>
+      </p:nvGrpSpPr>
+      <p:grpSpPr>
+        <a:xfrm>
+          <a:off x="0" y="0"/>
+          <a:ext cx="0" cy="0"/>
+          <a:chOff x="0" y="0"/>
+          <a:chExt cx="0" cy="0"/>
+        </a:xfrm>
+      </p:grpSpPr>
+      <p:sp>
+        <p:nvSpPr>
+          <p:cNvPr id="4" name="TextBox 3"/>
+          <p:cNvSpPr txBox="1"/>
+          <p:nvPr/>
+        </p:nvSpPr>
+        <p:spPr>
+          <a:xfrm>
+            <a:off x="609600" y="3124201"/>
+            <a:ext cx="5257800" cy="523220"/>
+          </a:xfrm>
+          <a:prstGeom prst="rect">
+            <a:avLst/>
+          </a:prstGeom>
+          <a:noFill/>
+        </p:spPr>
+        <p:txBody>
+          <a:bodyPr wrap="square" rtlCol="0">
+            <a:spAutoFit/>
+          </a:bodyPr>
+          <a:lstStyle/>
+          <a:p>
+            <a:r>
+              <a:rPr lang="en-US" sz="2800" b="1" dirty="0" smtClean="0">
+                <a:solidFill>
+                  <a:schemeClr val="bg1"/>
+                </a:solidFill>
+                <a:latin typeface="Candara" panose="020E0502030303020204" pitchFamily="34" charset="0"/>
+                <a:cs typeface="Iskoola Pota" panose="020B0502040204020203" pitchFamily="34" charset="0"/>
+              </a:rPr>
+              <a:t>Other JS frameworks</a:t>
+            </a:r>
+            <a:endParaRPr lang="en-US" sz="2800" b="1" dirty="0">
+              <a:solidFill>
+                <a:schemeClr val="bg1"/>
+              </a:solidFill>
+              <a:latin typeface="Candara" panose="020E0502030303020204" pitchFamily="34" charset="0"/>
+              <a:cs typeface="Iskoola Pota" panose="020B0502040204020203" pitchFamily="34" charset="0"/>
+            </a:endParaRPr>
+          </a:p>
+        </p:txBody>
+      </p:sp>
+    </p:spTree>
+    <p:extLst>
+      <p:ext uri="{BB962C8B-B14F-4D97-AF65-F5344CB8AC3E}">
+        <p14:creationId xmlns:p14="http://schemas.microsoft.com/office/powerpoint/2010/main" val="207097700"/>
       </p:ext>
     </p:extLst>
   </p:cSld>

</xml_diff>

<commit_message>
adding JS session data for today
</commit_message>
<xml_diff>
--- a/Session III - Javascript/Session III - Javascript.pptx
+++ b/Session III - Javascript/Session III - Javascript.pptx
@@ -137,6 +137,22 @@
       </a:defRPr>
     </a:lvl9pPr>
   </p:defaultTextStyle>
+  <p:extLst>
+    <p:ext uri="{EFAFB233-063F-42B5-8137-9DF3F51BA10A}">
+      <p15:sldGuideLst xmlns:p15="http://schemas.microsoft.com/office/powerpoint/2012/main">
+        <p15:guide id="1" orient="horz" pos="2160">
+          <p15:clr>
+            <a:srgbClr val="A4A3A4"/>
+          </p15:clr>
+        </p15:guide>
+        <p15:guide id="2" pos="2880">
+          <p15:clr>
+            <a:srgbClr val="A4A3A4"/>
+          </p15:clr>
+        </p15:guide>
+      </p15:sldGuideLst>
+    </p:ext>
+  </p:extLst>
 </p:presentation>
 </file>
 
@@ -222,7 +238,7 @@
           <a:p>
             <a:fld id="{4CE4D18D-5A8C-490C-B74C-2A622DAD4B6A}" type="datetimeFigureOut">
               <a:rPr lang="en-US" smtClean="0"/>
-              <a:t>28/6/15</a:t>
+              <a:t>29/6/2015</a:t>
             </a:fld>
             <a:endParaRPr lang="en-US"/>
           </a:p>
@@ -3125,7 +3141,7 @@
           <a:p>
             <a:fld id="{544FE318-C7DE-4051-894E-ED2E119555D3}" type="datetimeFigureOut">
               <a:rPr lang="en-US" smtClean="0"/>
-              <a:t>28/6/15</a:t>
+              <a:t>29/6/2015</a:t>
             </a:fld>
             <a:endParaRPr lang="en-US"/>
           </a:p>
@@ -3295,7 +3311,7 @@
           <a:p>
             <a:fld id="{544FE318-C7DE-4051-894E-ED2E119555D3}" type="datetimeFigureOut">
               <a:rPr lang="en-US" smtClean="0"/>
-              <a:t>28/6/15</a:t>
+              <a:t>29/6/2015</a:t>
             </a:fld>
             <a:endParaRPr lang="en-US"/>
           </a:p>
@@ -3475,7 +3491,7 @@
           <a:p>
             <a:fld id="{544FE318-C7DE-4051-894E-ED2E119555D3}" type="datetimeFigureOut">
               <a:rPr lang="en-US" smtClean="0"/>
-              <a:t>28/6/15</a:t>
+              <a:t>29/6/2015</a:t>
             </a:fld>
             <a:endParaRPr lang="en-US"/>
           </a:p>
@@ -3645,7 +3661,7 @@
           <a:p>
             <a:fld id="{544FE318-C7DE-4051-894E-ED2E119555D3}" type="datetimeFigureOut">
               <a:rPr lang="en-US" smtClean="0"/>
-              <a:t>28/6/15</a:t>
+              <a:t>29/6/2015</a:t>
             </a:fld>
             <a:endParaRPr lang="en-US"/>
           </a:p>
@@ -3891,7 +3907,7 @@
           <a:p>
             <a:fld id="{544FE318-C7DE-4051-894E-ED2E119555D3}" type="datetimeFigureOut">
               <a:rPr lang="en-US" smtClean="0"/>
-              <a:t>28/6/15</a:t>
+              <a:t>29/6/2015</a:t>
             </a:fld>
             <a:endParaRPr lang="en-US"/>
           </a:p>
@@ -4123,7 +4139,7 @@
           <a:p>
             <a:fld id="{544FE318-C7DE-4051-894E-ED2E119555D3}" type="datetimeFigureOut">
               <a:rPr lang="en-US" smtClean="0"/>
-              <a:t>28/6/15</a:t>
+              <a:t>29/6/2015</a:t>
             </a:fld>
             <a:endParaRPr lang="en-US"/>
           </a:p>
@@ -4490,7 +4506,7 @@
           <a:p>
             <a:fld id="{544FE318-C7DE-4051-894E-ED2E119555D3}" type="datetimeFigureOut">
               <a:rPr lang="en-US" smtClean="0"/>
-              <a:t>28/6/15</a:t>
+              <a:t>29/6/2015</a:t>
             </a:fld>
             <a:endParaRPr lang="en-US"/>
           </a:p>
@@ -4608,7 +4624,7 @@
           <a:p>
             <a:fld id="{544FE318-C7DE-4051-894E-ED2E119555D3}" type="datetimeFigureOut">
               <a:rPr lang="en-US" smtClean="0"/>
-              <a:t>28/6/15</a:t>
+              <a:t>29/6/2015</a:t>
             </a:fld>
             <a:endParaRPr lang="en-US"/>
           </a:p>
@@ -4703,7 +4719,7 @@
           <a:p>
             <a:fld id="{544FE318-C7DE-4051-894E-ED2E119555D3}" type="datetimeFigureOut">
               <a:rPr lang="en-US" smtClean="0"/>
-              <a:t>28/6/15</a:t>
+              <a:t>29/6/2015</a:t>
             </a:fld>
             <a:endParaRPr lang="en-US"/>
           </a:p>
@@ -4980,7 +4996,7 @@
           <a:p>
             <a:fld id="{544FE318-C7DE-4051-894E-ED2E119555D3}" type="datetimeFigureOut">
               <a:rPr lang="en-US" smtClean="0"/>
-              <a:t>28/6/15</a:t>
+              <a:t>29/6/2015</a:t>
             </a:fld>
             <a:endParaRPr lang="en-US"/>
           </a:p>
@@ -5233,7 +5249,7 @@
           <a:p>
             <a:fld id="{544FE318-C7DE-4051-894E-ED2E119555D3}" type="datetimeFigureOut">
               <a:rPr lang="en-US" smtClean="0"/>
-              <a:t>28/6/15</a:t>
+              <a:t>29/6/2015</a:t>
             </a:fld>
             <a:endParaRPr lang="en-US"/>
           </a:p>
@@ -5446,7 +5462,7 @@
           <a:p>
             <a:fld id="{544FE318-C7DE-4051-894E-ED2E119555D3}" type="datetimeFigureOut">
               <a:rPr lang="en-US" smtClean="0"/>
-              <a:t>28/6/15</a:t>
+              <a:t>29/6/2015</a:t>
             </a:fld>
             <a:endParaRPr lang="en-US"/>
           </a:p>
@@ -5910,7 +5926,7 @@
   <p:timing>
     <p:tnLst>
       <p:par>
-        <p:cTn xmlns:p14="http://schemas.microsoft.com/office/powerpoint/2010/main" id="1" dur="indefinite" restart="never" nodeType="tmRoot"/>
+        <p:cTn id="1" dur="indefinite" restart="never" nodeType="tmRoot"/>
       </p:par>
     </p:tnLst>
   </p:timing>
@@ -6088,7 +6104,7 @@
   <p:timing>
     <p:tnLst>
       <p:par>
-        <p:cTn xmlns:p14="http://schemas.microsoft.com/office/powerpoint/2010/main" id="1" dur="indefinite" restart="never" nodeType="tmRoot"/>
+        <p:cTn id="1" dur="indefinite" restart="never" nodeType="tmRoot"/>
       </p:par>
     </p:tnLst>
   </p:timing>
@@ -6256,7 +6272,7 @@
   <p:timing>
     <p:tnLst>
       <p:par>
-        <p:cTn xmlns:p14="http://schemas.microsoft.com/office/powerpoint/2010/main" id="1" dur="indefinite" restart="never" nodeType="tmRoot"/>
+        <p:cTn id="1" dur="indefinite" restart="never" nodeType="tmRoot"/>
       </p:par>
     </p:tnLst>
   </p:timing>
@@ -6352,16 +6368,7 @@
                 </a:solidFill>
                 <a:latin typeface="Candara" panose="020E0502030303020204" pitchFamily="34" charset="0"/>
               </a:rPr>
-              <a:t>COMPARISON </a:t>
-            </a:r>
-            <a:r>
-              <a:rPr lang="en-US" sz="1600" b="1" dirty="0" smtClean="0">
-                <a:solidFill>
-                  <a:schemeClr val="bg1"/>
-                </a:solidFill>
-                <a:latin typeface="Candara" panose="020E0502030303020204" pitchFamily="34" charset="0"/>
-              </a:rPr>
-              <a:t>OPERATORS</a:t>
+              <a:t>COMPARISON OPERATORS</a:t>
             </a:r>
             <a:endParaRPr lang="en-US" sz="1600" b="1" dirty="0">
               <a:solidFill>
@@ -6408,7 +6415,7 @@
   <p:timing>
     <p:tnLst>
       <p:par>
-        <p:cTn xmlns:p14="http://schemas.microsoft.com/office/powerpoint/2010/main" id="1" dur="indefinite" restart="never" nodeType="tmRoot"/>
+        <p:cTn id="1" dur="indefinite" restart="never" nodeType="tmRoot"/>
       </p:par>
     </p:tnLst>
   </p:timing>
@@ -6552,7 +6559,7 @@
   <p:timing>
     <p:tnLst>
       <p:par>
-        <p:cTn xmlns:p14="http://schemas.microsoft.com/office/powerpoint/2010/main" id="1" dur="indefinite" restart="never" nodeType="tmRoot"/>
+        <p:cTn id="1" dur="indefinite" restart="never" nodeType="tmRoot"/>
       </p:par>
     </p:tnLst>
   </p:timing>
@@ -6696,7 +6703,7 @@
   <p:timing>
     <p:tnLst>
       <p:par>
-        <p:cTn xmlns:p14="http://schemas.microsoft.com/office/powerpoint/2010/main" id="1" dur="indefinite" restart="never" nodeType="tmRoot"/>
+        <p:cTn id="1" dur="indefinite" restart="never" nodeType="tmRoot"/>
       </p:par>
     </p:tnLst>
   </p:timing>
@@ -6907,7 +6914,7 @@
   <p:timing>
     <p:tnLst>
       <p:par>
-        <p:cTn xmlns:p14="http://schemas.microsoft.com/office/powerpoint/2010/main" id="1" dur="indefinite" restart="never" nodeType="tmRoot"/>
+        <p:cTn id="1" dur="indefinite" restart="never" nodeType="tmRoot"/>
       </p:par>
     </p:tnLst>
   </p:timing>
@@ -7183,7 +7190,7 @@
   <p:timing>
     <p:tnLst>
       <p:par>
-        <p:cTn xmlns:p14="http://schemas.microsoft.com/office/powerpoint/2010/main" id="1" dur="indefinite" restart="never" nodeType="tmRoot"/>
+        <p:cTn id="1" dur="indefinite" restart="never" nodeType="tmRoot"/>
       </p:par>
     </p:tnLst>
   </p:timing>
@@ -7329,7 +7336,7 @@
   <p:timing>
     <p:tnLst>
       <p:par>
-        <p:cTn xmlns:p14="http://schemas.microsoft.com/office/powerpoint/2010/main" id="1" dur="indefinite" restart="never" nodeType="tmRoot"/>
+        <p:cTn id="1" dur="indefinite" restart="never" nodeType="tmRoot"/>
       </p:par>
     </p:tnLst>
   </p:timing>
@@ -7473,7 +7480,7 @@
   <p:timing>
     <p:tnLst>
       <p:par>
-        <p:cTn xmlns:p14="http://schemas.microsoft.com/office/powerpoint/2010/main" id="1" dur="indefinite" restart="never" nodeType="tmRoot"/>
+        <p:cTn id="1" dur="indefinite" restart="never" nodeType="tmRoot"/>
       </p:par>
     </p:tnLst>
   </p:timing>
@@ -7617,7 +7624,7 @@
   <p:timing>
     <p:tnLst>
       <p:par>
-        <p:cTn xmlns:p14="http://schemas.microsoft.com/office/powerpoint/2010/main" id="1" dur="indefinite" restart="never" nodeType="tmRoot"/>
+        <p:cTn id="1" dur="indefinite" restart="never" nodeType="tmRoot"/>
       </p:par>
     </p:tnLst>
   </p:timing>
@@ -7958,7 +7965,7 @@
   <p:timing>
     <p:tnLst>
       <p:par>
-        <p:cTn xmlns:p14="http://schemas.microsoft.com/office/powerpoint/2010/main" id="1" dur="indefinite" restart="never" nodeType="tmRoot"/>
+        <p:cTn id="1" dur="indefinite" restart="never" nodeType="tmRoot"/>
       </p:par>
     </p:tnLst>
   </p:timing>
@@ -8269,7 +8276,7 @@
   <p:timing>
     <p:tnLst>
       <p:par>
-        <p:cTn xmlns:p14="http://schemas.microsoft.com/office/powerpoint/2010/main" id="1" dur="indefinite" restart="never" nodeType="tmRoot"/>
+        <p:cTn id="1" dur="indefinite" restart="never" nodeType="tmRoot"/>
       </p:par>
     </p:tnLst>
   </p:timing>
@@ -8497,7 +8504,7 @@
   <p:timing>
     <p:tnLst>
       <p:par>
-        <p:cTn xmlns:p14="http://schemas.microsoft.com/office/powerpoint/2010/main" id="1" dur="indefinite" restart="never" nodeType="tmRoot"/>
+        <p:cTn id="1" dur="indefinite" restart="never" nodeType="tmRoot"/>
       </p:par>
     </p:tnLst>
   </p:timing>
@@ -8641,7 +8648,7 @@
   <p:timing>
     <p:tnLst>
       <p:par>
-        <p:cTn xmlns:p14="http://schemas.microsoft.com/office/powerpoint/2010/main" id="1" dur="indefinite" restart="never" nodeType="tmRoot"/>
+        <p:cTn id="1" dur="indefinite" restart="never" nodeType="tmRoot"/>
       </p:par>
     </p:tnLst>
   </p:timing>
@@ -8785,7 +8792,7 @@
   <p:timing>
     <p:tnLst>
       <p:par>
-        <p:cTn xmlns:p14="http://schemas.microsoft.com/office/powerpoint/2010/main" id="1" dur="indefinite" restart="never" nodeType="tmRoot"/>
+        <p:cTn id="1" dur="indefinite" restart="never" nodeType="tmRoot"/>
       </p:par>
     </p:tnLst>
   </p:timing>
@@ -8980,7 +8987,7 @@
   <p:timing>
     <p:tnLst>
       <p:par>
-        <p:cTn xmlns:p14="http://schemas.microsoft.com/office/powerpoint/2010/main" id="1" dur="indefinite" restart="never" nodeType="tmRoot"/>
+        <p:cTn id="1" dur="indefinite" restart="never" nodeType="tmRoot"/>
       </p:par>
     </p:tnLst>
   </p:timing>
@@ -9170,7 +9177,7 @@
   <p:timing>
     <p:tnLst>
       <p:par>
-        <p:cTn xmlns:p14="http://schemas.microsoft.com/office/powerpoint/2010/main" id="1" dur="indefinite" restart="never" nodeType="tmRoot"/>
+        <p:cTn id="1" dur="indefinite" restart="never" nodeType="tmRoot"/>
       </p:par>
     </p:tnLst>
   </p:timing>
@@ -9487,7 +9494,7 @@
   <p:timing>
     <p:tnLst>
       <p:par>
-        <p:cTn xmlns:p14="http://schemas.microsoft.com/office/powerpoint/2010/main" id="1" dur="indefinite" restart="never" nodeType="tmRoot"/>
+        <p:cTn id="1" dur="indefinite" restart="never" nodeType="tmRoot"/>
       </p:par>
     </p:tnLst>
   </p:timing>
@@ -9577,7 +9584,7 @@
   <p:timing>
     <p:tnLst>
       <p:par>
-        <p:cTn xmlns:p14="http://schemas.microsoft.com/office/powerpoint/2010/main" id="1" dur="indefinite" restart="never" nodeType="tmRoot"/>
+        <p:cTn id="1" dur="indefinite" restart="never" nodeType="tmRoot"/>
       </p:par>
     </p:tnLst>
   </p:timing>
@@ -10267,7 +10274,7 @@
   <p:timing>
     <p:tnLst>
       <p:par>
-        <p:cTn xmlns:p14="http://schemas.microsoft.com/office/powerpoint/2010/main" id="1" dur="indefinite" restart="never" nodeType="tmRoot"/>
+        <p:cTn id="1" dur="indefinite" restart="never" nodeType="tmRoot"/>
       </p:par>
     </p:tnLst>
   </p:timing>
@@ -10613,7 +10620,7 @@
   <p:timing>
     <p:tnLst>
       <p:par>
-        <p:cTn xmlns:p14="http://schemas.microsoft.com/office/powerpoint/2010/main" id="1" dur="indefinite" restart="never" nodeType="tmRoot"/>
+        <p:cTn id="1" dur="indefinite" restart="never" nodeType="tmRoot"/>
       </p:par>
     </p:tnLst>
   </p:timing>
@@ -10746,7 +10753,7 @@
           <a:noFill/>
           <a:extLst>
             <a:ext uri="{909E8E84-426E-40dd-AFC4-6F175D3DCCD1}">
-              <a14:hiddenFill xmlns:a14="http://schemas.microsoft.com/office/drawing/2010/main">
+              <a14:hiddenFill xmlns:a14="http://schemas.microsoft.com/office/drawing/2010/main" xmlns="">
                 <a:solidFill>
                   <a:srgbClr val="FFFFFF"/>
                 </a:solidFill>
@@ -10768,7 +10775,7 @@
   <p:timing>
     <p:tnLst>
       <p:par>
-        <p:cTn xmlns:p14="http://schemas.microsoft.com/office/powerpoint/2010/main" id="1" dur="indefinite" restart="never" nodeType="tmRoot"/>
+        <p:cTn id="1" dur="indefinite" restart="never" nodeType="tmRoot"/>
       </p:par>
     </p:tnLst>
   </p:timing>
@@ -10881,6 +10888,285 @@
           </a:p>
         </p:txBody>
       </p:sp>
+      <p:sp>
+        <p:nvSpPr>
+          <p:cNvPr id="2" name="Rectangle 1"/>
+          <p:cNvSpPr/>
+          <p:nvPr/>
+        </p:nvSpPr>
+        <p:spPr>
+          <a:xfrm>
+            <a:off x="2130357" y="5703121"/>
+            <a:ext cx="4572000" cy="646331"/>
+          </a:xfrm>
+          <a:prstGeom prst="rect">
+            <a:avLst/>
+          </a:prstGeom>
+          <a:solidFill>
+            <a:schemeClr val="accent2">
+              <a:lumMod val="50000"/>
+            </a:schemeClr>
+          </a:solidFill>
+        </p:spPr>
+        <p:txBody>
+          <a:bodyPr>
+            <a:spAutoFit/>
+          </a:bodyPr>
+          <a:lstStyle/>
+          <a:p>
+            <a:r>
+              <a:rPr lang="en-US" dirty="0">
+                <a:solidFill>
+                  <a:schemeClr val="bg1"/>
+                </a:solidFill>
+              </a:rPr>
+              <a:t>http://www.w3schools.com/jquery/tryit.asp?filename=tryjquery_ajax_ajax</a:t>
+            </a:r>
+          </a:p>
+        </p:txBody>
+      </p:sp>
+      <p:sp>
+        <p:nvSpPr>
+          <p:cNvPr id="5" name="Rectangle 4"/>
+          <p:cNvSpPr/>
+          <p:nvPr/>
+        </p:nvSpPr>
+        <p:spPr>
+          <a:xfrm>
+            <a:off x="1425295" y="711878"/>
+            <a:ext cx="6780179" cy="3970318"/>
+          </a:xfrm>
+          <a:prstGeom prst="rect">
+            <a:avLst/>
+          </a:prstGeom>
+        </p:spPr>
+        <p:txBody>
+          <a:bodyPr wrap="square">
+            <a:spAutoFit/>
+          </a:bodyPr>
+          <a:lstStyle/>
+          <a:p>
+            <a:r>
+              <a:rPr lang="en-US" dirty="0">
+                <a:latin typeface="Candara" panose="020E0502030303020204" pitchFamily="34" charset="0"/>
+              </a:rPr>
+              <a:t>$.</a:t>
+            </a:r>
+            <a:r>
+              <a:rPr lang="en-US" dirty="0" err="1">
+                <a:latin typeface="Candara" panose="020E0502030303020204" pitchFamily="34" charset="0"/>
+              </a:rPr>
+              <a:t>ajax</a:t>
+            </a:r>
+            <a:r>
+              <a:rPr lang="en-US" dirty="0">
+                <a:latin typeface="Candara" panose="020E0502030303020204" pitchFamily="34" charset="0"/>
+              </a:rPr>
+              <a:t>(</a:t>
+            </a:r>
+          </a:p>
+          <a:p>
+            <a:r>
+              <a:rPr lang="en-US" dirty="0">
+                <a:latin typeface="Candara" panose="020E0502030303020204" pitchFamily="34" charset="0"/>
+              </a:rPr>
+              <a:t>                    {</a:t>
+            </a:r>
+          </a:p>
+          <a:p>
+            <a:r>
+              <a:rPr lang="en-US" dirty="0">
+                <a:latin typeface="Candara" panose="020E0502030303020204" pitchFamily="34" charset="0"/>
+              </a:rPr>
+              <a:t>                        </a:t>
+            </a:r>
+            <a:r>
+              <a:rPr lang="en-US" dirty="0" err="1">
+                <a:latin typeface="Candara" panose="020E0502030303020204" pitchFamily="34" charset="0"/>
+              </a:rPr>
+              <a:t>url</a:t>
+            </a:r>
+            <a:r>
+              <a:rPr lang="en-US" dirty="0">
+                <a:latin typeface="Candara" panose="020E0502030303020204" pitchFamily="34" charset="0"/>
+              </a:rPr>
+              <a:t> : '/reservations',</a:t>
+            </a:r>
+          </a:p>
+          <a:p>
+            <a:r>
+              <a:rPr lang="en-US" dirty="0">
+                <a:latin typeface="Candara" panose="020E0502030303020204" pitchFamily="34" charset="0"/>
+              </a:rPr>
+              <a:t>                        type: "POST",</a:t>
+            </a:r>
+          </a:p>
+          <a:p>
+            <a:r>
+              <a:rPr lang="en-US" dirty="0">
+                <a:latin typeface="Candara" panose="020E0502030303020204" pitchFamily="34" charset="0"/>
+              </a:rPr>
+              <a:t>                        data : </a:t>
+            </a:r>
+            <a:r>
+              <a:rPr lang="en-US" dirty="0" err="1">
+                <a:latin typeface="Candara" panose="020E0502030303020204" pitchFamily="34" charset="0"/>
+              </a:rPr>
+              <a:t>postData</a:t>
+            </a:r>
+            <a:r>
+              <a:rPr lang="en-US" dirty="0">
+                <a:latin typeface="Candara" panose="020E0502030303020204" pitchFamily="34" charset="0"/>
+              </a:rPr>
+              <a:t>,</a:t>
+            </a:r>
+          </a:p>
+          <a:p>
+            <a:r>
+              <a:rPr lang="en-US" dirty="0">
+                <a:latin typeface="Candara" panose="020E0502030303020204" pitchFamily="34" charset="0"/>
+              </a:rPr>
+              <a:t>                        </a:t>
+            </a:r>
+            <a:r>
+              <a:rPr lang="en-US" dirty="0" err="1">
+                <a:latin typeface="Candara" panose="020E0502030303020204" pitchFamily="34" charset="0"/>
+              </a:rPr>
+              <a:t>success:function</a:t>
+            </a:r>
+            <a:r>
+              <a:rPr lang="en-US" dirty="0">
+                <a:latin typeface="Candara" panose="020E0502030303020204" pitchFamily="34" charset="0"/>
+              </a:rPr>
+              <a:t>(data, </a:t>
+            </a:r>
+            <a:r>
+              <a:rPr lang="en-US" dirty="0" err="1">
+                <a:latin typeface="Candara" panose="020E0502030303020204" pitchFamily="34" charset="0"/>
+              </a:rPr>
+              <a:t>textStatus</a:t>
+            </a:r>
+            <a:r>
+              <a:rPr lang="en-US" dirty="0">
+                <a:latin typeface="Candara" panose="020E0502030303020204" pitchFamily="34" charset="0"/>
+              </a:rPr>
+              <a:t>, </a:t>
+            </a:r>
+            <a:r>
+              <a:rPr lang="en-US" dirty="0" err="1">
+                <a:latin typeface="Candara" panose="020E0502030303020204" pitchFamily="34" charset="0"/>
+              </a:rPr>
+              <a:t>jqXHR</a:t>
+            </a:r>
+            <a:r>
+              <a:rPr lang="en-US" dirty="0">
+                <a:latin typeface="Candara" panose="020E0502030303020204" pitchFamily="34" charset="0"/>
+              </a:rPr>
+              <a:t>) </a:t>
+            </a:r>
+          </a:p>
+          <a:p>
+            <a:r>
+              <a:rPr lang="en-US" dirty="0">
+                <a:latin typeface="Candara" panose="020E0502030303020204" pitchFamily="34" charset="0"/>
+              </a:rPr>
+              <a:t>                        {</a:t>
+            </a:r>
+          </a:p>
+          <a:p>
+            <a:r>
+              <a:rPr lang="en-US" dirty="0">
+                <a:latin typeface="Candara" panose="020E0502030303020204" pitchFamily="34" charset="0"/>
+              </a:rPr>
+              <a:t>                            //data: return data from server</a:t>
+            </a:r>
+          </a:p>
+          <a:p>
+            <a:r>
+              <a:rPr lang="en-US" dirty="0">
+                <a:latin typeface="Candara" panose="020E0502030303020204" pitchFamily="34" charset="0"/>
+              </a:rPr>
+              <a:t>                        },</a:t>
+            </a:r>
+          </a:p>
+          <a:p>
+            <a:r>
+              <a:rPr lang="en-US" dirty="0">
+                <a:latin typeface="Candara" panose="020E0502030303020204" pitchFamily="34" charset="0"/>
+              </a:rPr>
+              <a:t>                        error: function(</a:t>
+            </a:r>
+            <a:r>
+              <a:rPr lang="en-US" dirty="0" err="1">
+                <a:latin typeface="Candara" panose="020E0502030303020204" pitchFamily="34" charset="0"/>
+              </a:rPr>
+              <a:t>jqXHR</a:t>
+            </a:r>
+            <a:r>
+              <a:rPr lang="en-US" dirty="0">
+                <a:latin typeface="Candara" panose="020E0502030303020204" pitchFamily="34" charset="0"/>
+              </a:rPr>
+              <a:t>, </a:t>
+            </a:r>
+            <a:r>
+              <a:rPr lang="en-US" dirty="0" err="1">
+                <a:latin typeface="Candara" panose="020E0502030303020204" pitchFamily="34" charset="0"/>
+              </a:rPr>
+              <a:t>textStatus</a:t>
+            </a:r>
+            <a:r>
+              <a:rPr lang="en-US" dirty="0">
+                <a:latin typeface="Candara" panose="020E0502030303020204" pitchFamily="34" charset="0"/>
+              </a:rPr>
+              <a:t>, </a:t>
+            </a:r>
+            <a:r>
+              <a:rPr lang="en-US" dirty="0" err="1">
+                <a:latin typeface="Candara" panose="020E0502030303020204" pitchFamily="34" charset="0"/>
+              </a:rPr>
+              <a:t>errorThrown</a:t>
+            </a:r>
+            <a:r>
+              <a:rPr lang="en-US" dirty="0">
+                <a:latin typeface="Candara" panose="020E0502030303020204" pitchFamily="34" charset="0"/>
+              </a:rPr>
+              <a:t>) </a:t>
+            </a:r>
+          </a:p>
+          <a:p>
+            <a:r>
+              <a:rPr lang="en-US" dirty="0">
+                <a:latin typeface="Candara" panose="020E0502030303020204" pitchFamily="34" charset="0"/>
+              </a:rPr>
+              <a:t>                        {</a:t>
+            </a:r>
+          </a:p>
+          <a:p>
+            <a:r>
+              <a:rPr lang="en-US" dirty="0">
+                <a:latin typeface="Candara" panose="020E0502030303020204" pitchFamily="34" charset="0"/>
+              </a:rPr>
+              <a:t>                            //if fails      </a:t>
+            </a:r>
+          </a:p>
+          <a:p>
+            <a:r>
+              <a:rPr lang="en-US" dirty="0">
+                <a:latin typeface="Candara" panose="020E0502030303020204" pitchFamily="34" charset="0"/>
+              </a:rPr>
+              <a:t>                        }</a:t>
+            </a:r>
+          </a:p>
+          <a:p>
+            <a:r>
+              <a:rPr lang="en-US" dirty="0">
+                <a:latin typeface="Candara" panose="020E0502030303020204" pitchFamily="34" charset="0"/>
+              </a:rPr>
+              <a:t>                    });</a:t>
+            </a:r>
+          </a:p>
+        </p:txBody>
+      </p:sp>
     </p:spTree>
     <p:extLst>
       <p:ext uri="{BB962C8B-B14F-4D97-AF65-F5344CB8AC3E}">
@@ -10894,7 +11180,7 @@
   <p:timing>
     <p:tnLst>
       <p:par>
-        <p:cTn xmlns:p14="http://schemas.microsoft.com/office/powerpoint/2010/main" id="1" dur="indefinite" restart="never" nodeType="tmRoot"/>
+        <p:cTn id="1" dur="indefinite" restart="never" nodeType="tmRoot"/>
       </p:par>
     </p:tnLst>
   </p:timing>
@@ -10984,7 +11270,7 @@
   <p:timing>
     <p:tnLst>
       <p:par>
-        <p:cTn xmlns:p14="http://schemas.microsoft.com/office/powerpoint/2010/main" id="1" dur="indefinite" restart="never" nodeType="tmRoot"/>
+        <p:cTn id="1" dur="indefinite" restart="never" nodeType="tmRoot"/>
       </p:par>
     </p:tnLst>
   </p:timing>
@@ -11232,7 +11518,7 @@
   <p:timing>
     <p:tnLst>
       <p:par>
-        <p:cTn xmlns:p14="http://schemas.microsoft.com/office/powerpoint/2010/main" id="1" dur="indefinite" restart="never" nodeType="tmRoot"/>
+        <p:cTn id="1" dur="indefinite" restart="never" nodeType="tmRoot"/>
       </p:par>
     </p:tnLst>
   </p:timing>
@@ -11582,7 +11868,7 @@
   <p:timing>
     <p:tnLst>
       <p:par>
-        <p:cTn xmlns:p14="http://schemas.microsoft.com/office/powerpoint/2010/main" id="1" dur="indefinite" restart="never" nodeType="tmRoot"/>
+        <p:cTn id="1" dur="indefinite" restart="never" nodeType="tmRoot"/>
       </p:par>
     </p:tnLst>
   </p:timing>
@@ -11844,7 +12130,7 @@
   <p:timing>
     <p:tnLst>
       <p:par>
-        <p:cTn xmlns:p14="http://schemas.microsoft.com/office/powerpoint/2010/main" id="1" dur="indefinite" restart="never" nodeType="tmRoot"/>
+        <p:cTn id="1" dur="indefinite" restart="never" nodeType="tmRoot"/>
       </p:par>
     </p:tnLst>
   </p:timing>
@@ -12208,7 +12494,7 @@
   <p:timing>
     <p:tnLst>
       <p:par>
-        <p:cTn xmlns:p14="http://schemas.microsoft.com/office/powerpoint/2010/main" id="1" dur="indefinite" restart="never" nodeType="tmRoot"/>
+        <p:cTn id="1" dur="indefinite" restart="never" nodeType="tmRoot"/>
       </p:par>
     </p:tnLst>
   </p:timing>
@@ -12386,7 +12672,7 @@
   <p:timing>
     <p:tnLst>
       <p:par>
-        <p:cTn xmlns:p14="http://schemas.microsoft.com/office/powerpoint/2010/main" id="1" dur="indefinite" restart="never" nodeType="tmRoot"/>
+        <p:cTn id="1" dur="indefinite" restart="never" nodeType="tmRoot"/>
       </p:par>
     </p:tnLst>
   </p:timing>
@@ -12564,7 +12850,7 @@
   <p:timing>
     <p:tnLst>
       <p:par>
-        <p:cTn xmlns:p14="http://schemas.microsoft.com/office/powerpoint/2010/main" id="1" dur="indefinite" restart="never" nodeType="tmRoot"/>
+        <p:cTn id="1" dur="indefinite" restart="never" nodeType="tmRoot"/>
       </p:par>
     </p:tnLst>
   </p:timing>
@@ -12826,7 +13112,7 @@
   <a:extraClrSchemeLst/>
   <a:extLst>
     <a:ext uri="{05A4C25C-085E-4340-85A3-A5531E510DB2}">
-      <thm15:themeFamily xmlns="" xmlns:thm15="http://schemas.microsoft.com/office/thememl/2012/main" name="Office Theme" id="{62F939B6-93AF-4DB8-9C6B-D6C7DFDC589F}" vid="{4A3C46E8-61CC-4603-A589-7422A47A8E4A}"/>
+      <thm15:themeFamily xmlns:thm15="http://schemas.microsoft.com/office/thememl/2012/main" name="Office Theme" id="{62F939B6-93AF-4DB8-9C6B-D6C7DFDC589F}" vid="{4A3C46E8-61CC-4603-A589-7422A47A8E4A}"/>
     </a:ext>
   </a:extLst>
 </a:theme>
@@ -13087,7 +13373,7 @@
   <a:extraClrSchemeLst/>
   <a:extLst>
     <a:ext uri="{05A4C25C-085E-4340-85A3-A5531E510DB2}">
-      <thm15:themeFamily xmlns="" xmlns:thm15="http://schemas.microsoft.com/office/thememl/2012/main" name="Office Theme" id="{62F939B6-93AF-4DB8-9C6B-D6C7DFDC589F}" vid="{4A3C46E8-61CC-4603-A589-7422A47A8E4A}"/>
+      <thm15:themeFamily xmlns:thm15="http://schemas.microsoft.com/office/thememl/2012/main" name="Office Theme" id="{62F939B6-93AF-4DB8-9C6B-D6C7DFDC589F}" vid="{4A3C46E8-61CC-4603-A589-7422A47A8E4A}"/>
     </a:ext>
   </a:extLst>
 </a:theme>

</xml_diff>